<commit_message>
Added class day 06.11.24
</commit_message>
<xml_diff>
--- a/UC2-FrontEnd/PPTs/2.3-Posicionamentos.pptx
+++ b/UC2-FrontEnd/PPTs/2.3-Posicionamentos.pptx
@@ -11,13 +11,14 @@
     <p:sldId id="259" r:id="rId5"/>
     <p:sldId id="260" r:id="rId6"/>
     <p:sldId id="261" r:id="rId7"/>
-    <p:sldId id="262" r:id="rId8"/>
-    <p:sldId id="266" r:id="rId9"/>
-    <p:sldId id="267" r:id="rId10"/>
-    <p:sldId id="263" r:id="rId11"/>
-    <p:sldId id="264" r:id="rId12"/>
-    <p:sldId id="265" r:id="rId13"/>
-    <p:sldId id="268" r:id="rId14"/>
+    <p:sldId id="266" r:id="rId8"/>
+    <p:sldId id="267" r:id="rId9"/>
+    <p:sldId id="263" r:id="rId10"/>
+    <p:sldId id="264" r:id="rId11"/>
+    <p:sldId id="265" r:id="rId12"/>
+    <p:sldId id="269" r:id="rId13"/>
+    <p:sldId id="270" r:id="rId14"/>
+    <p:sldId id="268" r:id="rId15"/>
   </p:sldIdLst>
   <p:sldSz cx="12192000" cy="6858000"/>
   <p:notesSz cx="6858000" cy="9144000"/>
@@ -116,7 +117,143 @@
       </a:defRPr>
     </a:lvl9pPr>
   </p:defaultTextStyle>
+  <p:extLst>
+    <p:ext uri="{EFAFB233-063F-42B5-8137-9DF3F51BA10A}">
+      <p15:sldGuideLst xmlns:p15="http://schemas.microsoft.com/office/powerpoint/2012/main"/>
+    </p:ext>
+  </p:extLst>
 </p:presentation>
+</file>
+
+<file path=ppt/revisionInfo.xml><?xml version="1.0" encoding="utf-8"?>
+<p1510:revInfo xmlns:a="http://schemas.openxmlformats.org/drawingml/2006/main" xmlns:r="http://schemas.openxmlformats.org/officeDocument/2006/relationships" xmlns:p1510="http://schemas.microsoft.com/office/powerpoint/2015/10/main">
+  <p1510:revLst>
+    <p1510:client id="{C9C96D79-52B4-4C18-9ECD-6593713ECD66}" v="1" dt="2024-11-07T04:02:17.903"/>
+  </p1510:revLst>
+</p1510:revInfo>
+</file>
+
+<file path=ppt/changesInfos/changesInfo1.xml><?xml version="1.0" encoding="utf-8"?>
+<pc:chgInfo xmlns:a="http://schemas.openxmlformats.org/drawingml/2006/main" xmlns:r="http://schemas.openxmlformats.org/officeDocument/2006/relationships" xmlns:ac="http://schemas.microsoft.com/office/drawing/2013/main/command" xmlns:pc="http://schemas.microsoft.com/office/powerpoint/2013/main/command">
+  <pc:docChgLst>
+    <pc:chgData name="Pablo Garcia" userId="45d086511dae29ac" providerId="LiveId" clId="{C9C96D79-52B4-4C18-9ECD-6593713ECD66}"/>
+    <pc:docChg chg="undo custSel addSld delSld modSld sldOrd">
+      <pc:chgData name="Pablo Garcia" userId="45d086511dae29ac" providerId="LiveId" clId="{C9C96D79-52B4-4C18-9ECD-6593713ECD66}" dt="2024-11-07T04:03:32.423" v="452" actId="1037"/>
+      <pc:docMkLst>
+        <pc:docMk/>
+      </pc:docMkLst>
+      <pc:sldChg chg="del">
+        <pc:chgData name="Pablo Garcia" userId="45d086511dae29ac" providerId="LiveId" clId="{C9C96D79-52B4-4C18-9ECD-6593713ECD66}" dt="2024-11-07T03:45:06.784" v="400" actId="47"/>
+        <pc:sldMkLst>
+          <pc:docMk/>
+          <pc:sldMk cId="1993709416" sldId="262"/>
+        </pc:sldMkLst>
+      </pc:sldChg>
+      <pc:sldChg chg="addSp delSp modSp add mod ord">
+        <pc:chgData name="Pablo Garcia" userId="45d086511dae29ac" providerId="LiveId" clId="{C9C96D79-52B4-4C18-9ECD-6593713ECD66}" dt="2024-11-07T03:03:25.389" v="399" actId="1076"/>
+        <pc:sldMkLst>
+          <pc:docMk/>
+          <pc:sldMk cId="786747109" sldId="269"/>
+        </pc:sldMkLst>
+        <pc:spChg chg="del">
+          <ac:chgData name="Pablo Garcia" userId="45d086511dae29ac" providerId="LiveId" clId="{C9C96D79-52B4-4C18-9ECD-6593713ECD66}" dt="2024-11-06T13:18:40.854" v="16" actId="478"/>
+          <ac:spMkLst>
+            <pc:docMk/>
+            <pc:sldMk cId="786747109" sldId="269"/>
+            <ac:spMk id="4" creationId="{E925326B-38DD-5679-4405-3C4F20ED361D}"/>
+          </ac:spMkLst>
+        </pc:spChg>
+        <pc:spChg chg="mod">
+          <ac:chgData name="Pablo Garcia" userId="45d086511dae29ac" providerId="LiveId" clId="{C9C96D79-52B4-4C18-9ECD-6593713ECD66}" dt="2024-11-07T03:03:15.541" v="395" actId="14100"/>
+          <ac:spMkLst>
+            <pc:docMk/>
+            <pc:sldMk cId="786747109" sldId="269"/>
+            <ac:spMk id="6" creationId="{ED913002-49AD-9B14-9388-5ABDA103C290}"/>
+          </ac:spMkLst>
+        </pc:spChg>
+        <pc:spChg chg="add del mod">
+          <ac:chgData name="Pablo Garcia" userId="45d086511dae29ac" providerId="LiveId" clId="{C9C96D79-52B4-4C18-9ECD-6593713ECD66}" dt="2024-11-06T13:21:11.634" v="306" actId="14100"/>
+          <ac:spMkLst>
+            <pc:docMk/>
+            <pc:sldMk cId="786747109" sldId="269"/>
+            <ac:spMk id="8" creationId="{F9742BAF-05C1-B356-EE08-416A68150345}"/>
+          </ac:spMkLst>
+        </pc:spChg>
+        <pc:picChg chg="del">
+          <ac:chgData name="Pablo Garcia" userId="45d086511dae29ac" providerId="LiveId" clId="{C9C96D79-52B4-4C18-9ECD-6593713ECD66}" dt="2024-11-06T13:18:47.192" v="19" actId="478"/>
+          <ac:picMkLst>
+            <pc:docMk/>
+            <pc:sldMk cId="786747109" sldId="269"/>
+            <ac:picMk id="3" creationId="{7E20FE8E-2ECC-FC55-EE0D-9D23B986F37B}"/>
+          </ac:picMkLst>
+        </pc:picChg>
+        <pc:picChg chg="add del mod modCrop">
+          <ac:chgData name="Pablo Garcia" userId="45d086511dae29ac" providerId="LiveId" clId="{C9C96D79-52B4-4C18-9ECD-6593713ECD66}" dt="2024-11-07T03:02:42.242" v="344" actId="22"/>
+          <ac:picMkLst>
+            <pc:docMk/>
+            <pc:sldMk cId="786747109" sldId="269"/>
+            <ac:picMk id="3" creationId="{D20FD90F-BD44-73B6-6115-3547F47B0406}"/>
+          </ac:picMkLst>
+        </pc:picChg>
+        <pc:picChg chg="add del mod">
+          <ac:chgData name="Pablo Garcia" userId="45d086511dae29ac" providerId="LiveId" clId="{C9C96D79-52B4-4C18-9ECD-6593713ECD66}" dt="2024-11-07T03:03:25.389" v="399" actId="1076"/>
+          <ac:picMkLst>
+            <pc:docMk/>
+            <pc:sldMk cId="786747109" sldId="269"/>
+            <ac:picMk id="7" creationId="{EA7245D4-E54A-342B-9FD6-2105D47BD2A0}"/>
+          </ac:picMkLst>
+        </pc:picChg>
+      </pc:sldChg>
+      <pc:sldChg chg="addSp delSp modSp add mod ord">
+        <pc:chgData name="Pablo Garcia" userId="45d086511dae29ac" providerId="LiveId" clId="{C9C96D79-52B4-4C18-9ECD-6593713ECD66}" dt="2024-11-07T04:03:32.423" v="452" actId="1037"/>
+        <pc:sldMkLst>
+          <pc:docMk/>
+          <pc:sldMk cId="347869449" sldId="270"/>
+        </pc:sldMkLst>
+        <pc:spChg chg="del">
+          <ac:chgData name="Pablo Garcia" userId="45d086511dae29ac" providerId="LiveId" clId="{C9C96D79-52B4-4C18-9ECD-6593713ECD66}" dt="2024-11-07T03:58:32.270" v="418" actId="478"/>
+          <ac:spMkLst>
+            <pc:docMk/>
+            <pc:sldMk cId="347869449" sldId="270"/>
+            <ac:spMk id="4" creationId="{1110E649-8F22-F499-CB29-FF159D49007B}"/>
+          </ac:spMkLst>
+        </pc:spChg>
+        <pc:spChg chg="mod">
+          <ac:chgData name="Pablo Garcia" userId="45d086511dae29ac" providerId="LiveId" clId="{C9C96D79-52B4-4C18-9ECD-6593713ECD66}" dt="2024-11-07T03:58:29.636" v="417" actId="20577"/>
+          <ac:spMkLst>
+            <pc:docMk/>
+            <pc:sldMk cId="347869449" sldId="270"/>
+            <ac:spMk id="6" creationId="{CB6644BD-B3F3-77D4-F769-E12433101E28}"/>
+          </ac:spMkLst>
+        </pc:spChg>
+        <pc:spChg chg="add mod">
+          <ac:chgData name="Pablo Garcia" userId="45d086511dae29ac" providerId="LiveId" clId="{C9C96D79-52B4-4C18-9ECD-6593713ECD66}" dt="2024-11-07T04:03:32.423" v="452" actId="1037"/>
+          <ac:spMkLst>
+            <pc:docMk/>
+            <pc:sldMk cId="347869449" sldId="270"/>
+            <ac:spMk id="8" creationId="{A264FFE8-F56D-1DA4-A474-3E1B23A82B47}"/>
+          </ac:spMkLst>
+        </pc:spChg>
+        <pc:picChg chg="add mod">
+          <ac:chgData name="Pablo Garcia" userId="45d086511dae29ac" providerId="LiveId" clId="{C9C96D79-52B4-4C18-9ECD-6593713ECD66}" dt="2024-11-07T04:02:10.440" v="423" actId="14100"/>
+          <ac:picMkLst>
+            <pc:docMk/>
+            <pc:sldMk cId="347869449" sldId="270"/>
+            <ac:picMk id="3" creationId="{328969E0-8411-20B3-2D05-11AE8F8C0C78}"/>
+          </ac:picMkLst>
+        </pc:picChg>
+        <pc:picChg chg="del">
+          <ac:chgData name="Pablo Garcia" userId="45d086511dae29ac" providerId="LiveId" clId="{C9C96D79-52B4-4C18-9ECD-6593713ECD66}" dt="2024-11-07T03:58:33.107" v="419" actId="478"/>
+          <ac:picMkLst>
+            <pc:docMk/>
+            <pc:sldMk cId="347869449" sldId="270"/>
+            <ac:picMk id="7" creationId="{5D313A93-A06D-E8FF-E08B-5877E13673CD}"/>
+          </ac:picMkLst>
+        </pc:picChg>
+      </pc:sldChg>
+    </pc:docChg>
+  </pc:docChgLst>
+</pc:chgInfo>
 </file>
 
 <file path=ppt/slideLayouts/slideLayout1.xml><?xml version="1.0" encoding="utf-8"?>
@@ -268,7 +405,7 @@
           <a:p>
             <a:fld id="{A7FEE873-310C-4F57-8539-A553124A7367}" type="datetimeFigureOut">
               <a:rPr lang="pt-BR" smtClean="0"/>
-              <a:t>05/11/2024</a:t>
+              <a:t>07/11/2024</a:t>
             </a:fld>
             <a:endParaRPr lang="pt-BR"/>
           </a:p>
@@ -468,7 +605,7 @@
           <a:p>
             <a:fld id="{A7FEE873-310C-4F57-8539-A553124A7367}" type="datetimeFigureOut">
               <a:rPr lang="pt-BR" smtClean="0"/>
-              <a:t>05/11/2024</a:t>
+              <a:t>07/11/2024</a:t>
             </a:fld>
             <a:endParaRPr lang="pt-BR"/>
           </a:p>
@@ -678,7 +815,7 @@
           <a:p>
             <a:fld id="{A7FEE873-310C-4F57-8539-A553124A7367}" type="datetimeFigureOut">
               <a:rPr lang="pt-BR" smtClean="0"/>
-              <a:t>05/11/2024</a:t>
+              <a:t>07/11/2024</a:t>
             </a:fld>
             <a:endParaRPr lang="pt-BR"/>
           </a:p>
@@ -878,7 +1015,7 @@
           <a:p>
             <a:fld id="{A7FEE873-310C-4F57-8539-A553124A7367}" type="datetimeFigureOut">
               <a:rPr lang="pt-BR" smtClean="0"/>
-              <a:t>05/11/2024</a:t>
+              <a:t>07/11/2024</a:t>
             </a:fld>
             <a:endParaRPr lang="pt-BR"/>
           </a:p>
@@ -1154,7 +1291,7 @@
           <a:p>
             <a:fld id="{A7FEE873-310C-4F57-8539-A553124A7367}" type="datetimeFigureOut">
               <a:rPr lang="pt-BR" smtClean="0"/>
-              <a:t>05/11/2024</a:t>
+              <a:t>07/11/2024</a:t>
             </a:fld>
             <a:endParaRPr lang="pt-BR"/>
           </a:p>
@@ -1422,7 +1559,7 @@
           <a:p>
             <a:fld id="{A7FEE873-310C-4F57-8539-A553124A7367}" type="datetimeFigureOut">
               <a:rPr lang="pt-BR" smtClean="0"/>
-              <a:t>05/11/2024</a:t>
+              <a:t>07/11/2024</a:t>
             </a:fld>
             <a:endParaRPr lang="pt-BR"/>
           </a:p>
@@ -1837,7 +1974,7 @@
           <a:p>
             <a:fld id="{A7FEE873-310C-4F57-8539-A553124A7367}" type="datetimeFigureOut">
               <a:rPr lang="pt-BR" smtClean="0"/>
-              <a:t>05/11/2024</a:t>
+              <a:t>07/11/2024</a:t>
             </a:fld>
             <a:endParaRPr lang="pt-BR"/>
           </a:p>
@@ -1979,7 +2116,7 @@
           <a:p>
             <a:fld id="{A7FEE873-310C-4F57-8539-A553124A7367}" type="datetimeFigureOut">
               <a:rPr lang="pt-BR" smtClean="0"/>
-              <a:t>05/11/2024</a:t>
+              <a:t>07/11/2024</a:t>
             </a:fld>
             <a:endParaRPr lang="pt-BR"/>
           </a:p>
@@ -2092,7 +2229,7 @@
           <a:p>
             <a:fld id="{A7FEE873-310C-4F57-8539-A553124A7367}" type="datetimeFigureOut">
               <a:rPr lang="pt-BR" smtClean="0"/>
-              <a:t>05/11/2024</a:t>
+              <a:t>07/11/2024</a:t>
             </a:fld>
             <a:endParaRPr lang="pt-BR"/>
           </a:p>
@@ -2405,7 +2542,7 @@
           <a:p>
             <a:fld id="{A7FEE873-310C-4F57-8539-A553124A7367}" type="datetimeFigureOut">
               <a:rPr lang="pt-BR" smtClean="0"/>
-              <a:t>05/11/2024</a:t>
+              <a:t>07/11/2024</a:t>
             </a:fld>
             <a:endParaRPr lang="pt-BR"/>
           </a:p>
@@ -2694,7 +2831,7 @@
           <a:p>
             <a:fld id="{A7FEE873-310C-4F57-8539-A553124A7367}" type="datetimeFigureOut">
               <a:rPr lang="pt-BR" smtClean="0"/>
-              <a:t>05/11/2024</a:t>
+              <a:t>07/11/2024</a:t>
             </a:fld>
             <a:endParaRPr lang="pt-BR"/>
           </a:p>
@@ -2937,7 +3074,7 @@
           <a:p>
             <a:fld id="{A7FEE873-310C-4F57-8539-A553124A7367}" type="datetimeFigureOut">
               <a:rPr lang="pt-BR" smtClean="0"/>
-              <a:t>05/11/2024</a:t>
+              <a:t>07/11/2024</a:t>
             </a:fld>
             <a:endParaRPr lang="pt-BR"/>
           </a:p>
@@ -3547,13 +3684,13 @@
   <p:clrMapOvr>
     <a:masterClrMapping/>
   </p:clrMapOvr>
-  <mc:AlternateContent xmlns:mc="http://schemas.openxmlformats.org/markup-compatibility/2006">
-    <mc:Choice xmlns:p159="http://schemas.microsoft.com/office/powerpoint/2015/09/main" Requires="p159">
+  <mc:AlternateContent xmlns:mc="http://schemas.openxmlformats.org/markup-compatibility/2006" xmlns:p159="http://schemas.microsoft.com/office/powerpoint/2015/09/main">
+    <mc:Choice Requires="p159">
       <p:transition xmlns:p14="http://schemas.microsoft.com/office/powerpoint/2010/main" spd="slow" p14:dur="2000">
         <p159:morph option="byObject"/>
       </p:transition>
     </mc:Choice>
-    <mc:Fallback>
+    <mc:Fallback xmlns="">
       <p:transition spd="slow">
         <p:fade/>
       </p:transition>
@@ -3563,352 +3700,6 @@
 </file>
 
 <file path=ppt/slides/slide10.xml><?xml version="1.0" encoding="utf-8"?>
-<p:sld xmlns:a="http://schemas.openxmlformats.org/drawingml/2006/main" xmlns:r="http://schemas.openxmlformats.org/officeDocument/2006/relationships" xmlns:p="http://schemas.openxmlformats.org/presentationml/2006/main">
-  <p:cSld>
-    <p:bg>
-      <p:bgPr>
-        <a:blipFill dpi="0" rotWithShape="1">
-          <a:blip r:embed="rId2">
-            <a:alphaModFix amt="50000"/>
-            <a:lum/>
-          </a:blip>
-          <a:srcRect/>
-          <a:stretch>
-            <a:fillRect t="-4000" b="-4000"/>
-          </a:stretch>
-        </a:blipFill>
-        <a:effectLst/>
-      </p:bgPr>
-    </p:bg>
-    <p:spTree>
-      <p:nvGrpSpPr>
-        <p:cNvPr id="1" name="">
-          <a:extLst>
-            <a:ext uri="{FF2B5EF4-FFF2-40B4-BE49-F238E27FC236}">
-              <a16:creationId xmlns:a16="http://schemas.microsoft.com/office/drawing/2014/main" id="{EB3360B7-A4B9-D265-083B-E9E81E53CB40}"/>
-            </a:ext>
-          </a:extLst>
-        </p:cNvPr>
-        <p:cNvGrpSpPr/>
-        <p:nvPr/>
-      </p:nvGrpSpPr>
-      <p:grpSpPr>
-        <a:xfrm>
-          <a:off x="0" y="0"/>
-          <a:ext cx="0" cy="0"/>
-          <a:chOff x="0" y="0"/>
-          <a:chExt cx="0" cy="0"/>
-        </a:xfrm>
-      </p:grpSpPr>
-      <p:sp>
-        <p:nvSpPr>
-          <p:cNvPr id="4" name="Rectangle: Rounded Corners 3">
-            <a:extLst>
-              <a:ext uri="{FF2B5EF4-FFF2-40B4-BE49-F238E27FC236}">
-                <a16:creationId xmlns:a16="http://schemas.microsoft.com/office/drawing/2014/main" id="{4174F353-F0AD-D7EA-C1EE-E6ACB325632C}"/>
-              </a:ext>
-            </a:extLst>
-          </p:cNvPr>
-          <p:cNvSpPr/>
-          <p:nvPr/>
-        </p:nvSpPr>
-        <p:spPr>
-          <a:xfrm>
-            <a:off x="450714" y="1809345"/>
-            <a:ext cx="4053192" cy="2286000"/>
-          </a:xfrm>
-          <a:prstGeom prst="roundRect">
-            <a:avLst>
-              <a:gd name="adj" fmla="val 6641"/>
-            </a:avLst>
-          </a:prstGeom>
-          <a:solidFill>
-            <a:schemeClr val="tx1">
-              <a:lumMod val="75000"/>
-              <a:lumOff val="25000"/>
-            </a:schemeClr>
-          </a:solidFill>
-          <a:ln>
-            <a:solidFill>
-              <a:srgbClr val="FFFF00"/>
-            </a:solidFill>
-          </a:ln>
-        </p:spPr>
-        <p:style>
-          <a:lnRef idx="2">
-            <a:schemeClr val="accent1">
-              <a:shade val="15000"/>
-            </a:schemeClr>
-          </a:lnRef>
-          <a:fillRef idx="1">
-            <a:schemeClr val="accent1"/>
-          </a:fillRef>
-          <a:effectRef idx="0">
-            <a:schemeClr val="accent1"/>
-          </a:effectRef>
-          <a:fontRef idx="minor">
-            <a:schemeClr val="lt1"/>
-          </a:fontRef>
-        </p:style>
-        <p:txBody>
-          <a:bodyPr rtlCol="0" anchor="t"/>
-          <a:lstStyle/>
-          <a:p>
-            <a:r>
-              <a:rPr lang="pt-BR" dirty="0"/>
-              <a:t>Esses dois métodos são altamente recomendados para construir layouts mais responsivos e dinâmicos. Ambos facilitam o alinhamento e o posicionamento de elementos dentro de um container, mas possuem abordagens ligeiramente diferentes:</a:t>
-            </a:r>
-          </a:p>
-        </p:txBody>
-      </p:sp>
-      <p:pic>
-        <p:nvPicPr>
-          <p:cNvPr id="5" name="Picture 4" descr="A blue and orange logo">
-            <a:extLst>
-              <a:ext uri="{FF2B5EF4-FFF2-40B4-BE49-F238E27FC236}">
-                <a16:creationId xmlns:a16="http://schemas.microsoft.com/office/drawing/2014/main" id="{2B902A59-7B67-F3E3-B1F6-0F81B5155494}"/>
-              </a:ext>
-            </a:extLst>
-          </p:cNvPr>
-          <p:cNvPicPr>
-            <a:picLocks noChangeAspect="1"/>
-          </p:cNvPicPr>
-          <p:nvPr/>
-        </p:nvPicPr>
-        <p:blipFill>
-          <a:blip r:embed="rId3">
-            <a:extLst>
-              <a:ext uri="{28A0092B-C50C-407E-A947-70E740481C1C}">
-                <a14:useLocalDpi xmlns:a14="http://schemas.microsoft.com/office/drawing/2010/main" val="0"/>
-              </a:ext>
-            </a:extLst>
-          </a:blip>
-          <a:srcRect r="40990"/>
-          <a:stretch/>
-        </p:blipFill>
-        <p:spPr>
-          <a:xfrm>
-            <a:off x="10752304" y="12502"/>
-            <a:ext cx="1429966" cy="986828"/>
-          </a:xfrm>
-          <a:prstGeom prst="rect">
-            <a:avLst/>
-          </a:prstGeom>
-        </p:spPr>
-      </p:pic>
-      <p:sp>
-        <p:nvSpPr>
-          <p:cNvPr id="6" name="Rectangle: Rounded Corners 5">
-            <a:extLst>
-              <a:ext uri="{FF2B5EF4-FFF2-40B4-BE49-F238E27FC236}">
-                <a16:creationId xmlns:a16="http://schemas.microsoft.com/office/drawing/2014/main" id="{F5EDE1D2-879C-F22C-9BDE-EFD5454EAE44}"/>
-              </a:ext>
-            </a:extLst>
-          </p:cNvPr>
-          <p:cNvSpPr/>
-          <p:nvPr/>
-        </p:nvSpPr>
-        <p:spPr>
-          <a:xfrm>
-            <a:off x="450714" y="634994"/>
-            <a:ext cx="7360598" cy="986829"/>
-          </a:xfrm>
-          <a:prstGeom prst="roundRect">
-            <a:avLst/>
-          </a:prstGeom>
-          <a:solidFill>
-            <a:schemeClr val="tx1">
-              <a:lumMod val="75000"/>
-              <a:lumOff val="25000"/>
-            </a:schemeClr>
-          </a:solidFill>
-          <a:ln>
-            <a:solidFill>
-              <a:srgbClr val="FFFF00"/>
-            </a:solidFill>
-          </a:ln>
-        </p:spPr>
-        <p:style>
-          <a:lnRef idx="2">
-            <a:schemeClr val="accent1">
-              <a:shade val="15000"/>
-            </a:schemeClr>
-          </a:lnRef>
-          <a:fillRef idx="1">
-            <a:schemeClr val="accent1"/>
-          </a:fillRef>
-          <a:effectRef idx="0">
-            <a:schemeClr val="accent1"/>
-          </a:effectRef>
-          <a:fontRef idx="minor">
-            <a:schemeClr val="lt1"/>
-          </a:fontRef>
-        </p:style>
-        <p:txBody>
-          <a:bodyPr rtlCol="0" anchor="ctr"/>
-          <a:lstStyle/>
-          <a:p>
-            <a:r>
-              <a:rPr lang="pt-BR" sz="3600" dirty="0"/>
-              <a:t>Posicionamento com </a:t>
-            </a:r>
-            <a:r>
-              <a:rPr lang="pt-BR" sz="3600" dirty="0" err="1"/>
-              <a:t>Flexbox</a:t>
-            </a:r>
-            <a:r>
-              <a:rPr lang="pt-BR" sz="3600" dirty="0"/>
-              <a:t> e Grid</a:t>
-            </a:r>
-          </a:p>
-        </p:txBody>
-      </p:sp>
-      <p:sp>
-        <p:nvSpPr>
-          <p:cNvPr id="2" name="Rectangle: Rounded Corners 1">
-            <a:extLst>
-              <a:ext uri="{FF2B5EF4-FFF2-40B4-BE49-F238E27FC236}">
-                <a16:creationId xmlns:a16="http://schemas.microsoft.com/office/drawing/2014/main" id="{F6D2E17A-F19C-32BE-95A7-C3330B960981}"/>
-              </a:ext>
-            </a:extLst>
-          </p:cNvPr>
-          <p:cNvSpPr/>
-          <p:nvPr/>
-        </p:nvSpPr>
-        <p:spPr>
-          <a:xfrm>
-            <a:off x="450714" y="4282867"/>
-            <a:ext cx="4481209" cy="2003898"/>
-          </a:xfrm>
-          <a:prstGeom prst="roundRect">
-            <a:avLst>
-              <a:gd name="adj" fmla="val 6641"/>
-            </a:avLst>
-          </a:prstGeom>
-          <a:solidFill>
-            <a:schemeClr val="tx1">
-              <a:lumMod val="75000"/>
-              <a:lumOff val="25000"/>
-            </a:schemeClr>
-          </a:solidFill>
-          <a:ln>
-            <a:solidFill>
-              <a:srgbClr val="FFFF00"/>
-            </a:solidFill>
-          </a:ln>
-        </p:spPr>
-        <p:style>
-          <a:lnRef idx="2">
-            <a:schemeClr val="accent1">
-              <a:shade val="15000"/>
-            </a:schemeClr>
-          </a:lnRef>
-          <a:fillRef idx="1">
-            <a:schemeClr val="accent1"/>
-          </a:fillRef>
-          <a:effectRef idx="0">
-            <a:schemeClr val="accent1"/>
-          </a:effectRef>
-          <a:fontRef idx="minor">
-            <a:schemeClr val="lt1"/>
-          </a:fontRef>
-        </p:style>
-        <p:txBody>
-          <a:bodyPr rtlCol="0" anchor="t"/>
-          <a:lstStyle/>
-          <a:p>
-            <a:pPr marL="342900" indent="-342900">
-              <a:buFont typeface="Arial" panose="020B0604020202020204" pitchFamily="34" charset="0"/>
-              <a:buChar char="•"/>
-            </a:pPr>
-            <a:r>
-              <a:rPr lang="pt-BR" sz="1500" b="1" dirty="0" err="1"/>
-              <a:t>Flexbox</a:t>
-            </a:r>
-            <a:r>
-              <a:rPr lang="pt-BR" sz="1500" dirty="0"/>
-              <a:t> é ideal para layouts unidimensionais (uma linha ou uma coluna).</a:t>
-            </a:r>
-          </a:p>
-          <a:p>
-            <a:pPr marL="342900" indent="-342900">
-              <a:buFont typeface="Arial" panose="020B0604020202020204" pitchFamily="34" charset="0"/>
-              <a:buChar char="•"/>
-            </a:pPr>
-            <a:endParaRPr lang="pt-BR" sz="1500" dirty="0"/>
-          </a:p>
-          <a:p>
-            <a:pPr marL="342900" indent="-342900">
-              <a:buFont typeface="Arial" panose="020B0604020202020204" pitchFamily="34" charset="0"/>
-              <a:buChar char="•"/>
-            </a:pPr>
-            <a:r>
-              <a:rPr lang="pt-BR" sz="1500" b="1" dirty="0"/>
-              <a:t>Grid</a:t>
-            </a:r>
-            <a:r>
-              <a:rPr lang="pt-BR" sz="1500" dirty="0"/>
-              <a:t> é mais potente para layouts bidimensionais, permitindo organizar elementos em linhas e colunas simultaneamente.</a:t>
-            </a:r>
-          </a:p>
-        </p:txBody>
-      </p:sp>
-      <p:pic>
-        <p:nvPicPr>
-          <p:cNvPr id="8" name="Picture 7">
-            <a:extLst>
-              <a:ext uri="{FF2B5EF4-FFF2-40B4-BE49-F238E27FC236}">
-                <a16:creationId xmlns:a16="http://schemas.microsoft.com/office/drawing/2014/main" id="{B4E40B3E-91AB-58BC-2577-46F90C9A78DC}"/>
-              </a:ext>
-            </a:extLst>
-          </p:cNvPr>
-          <p:cNvPicPr>
-            <a:picLocks noChangeAspect="1"/>
-          </p:cNvPicPr>
-          <p:nvPr/>
-        </p:nvPicPr>
-        <p:blipFill>
-          <a:blip r:embed="rId4"/>
-          <a:stretch>
-            <a:fillRect/>
-          </a:stretch>
-        </p:blipFill>
-        <p:spPr>
-          <a:xfrm>
-            <a:off x="5082078" y="1721796"/>
-            <a:ext cx="6852098" cy="3650708"/>
-          </a:xfrm>
-          <a:prstGeom prst="rect">
-            <a:avLst/>
-          </a:prstGeom>
-        </p:spPr>
-      </p:pic>
-    </p:spTree>
-    <p:extLst>
-      <p:ext uri="{BB962C8B-B14F-4D97-AF65-F5344CB8AC3E}">
-        <p14:creationId xmlns:p14="http://schemas.microsoft.com/office/powerpoint/2010/main" val="1500817691"/>
-      </p:ext>
-    </p:extLst>
-  </p:cSld>
-  <p:clrMapOvr>
-    <a:masterClrMapping/>
-  </p:clrMapOvr>
-  <mc:AlternateContent xmlns:mc="http://schemas.openxmlformats.org/markup-compatibility/2006">
-    <mc:Choice xmlns:p159="http://schemas.microsoft.com/office/powerpoint/2015/09/main" Requires="p159">
-      <p:transition xmlns:p14="http://schemas.microsoft.com/office/powerpoint/2010/main" spd="slow" p14:dur="2000">
-        <p159:morph option="byObject"/>
-      </p:transition>
-    </mc:Choice>
-    <mc:Fallback>
-      <p:transition spd="slow">
-        <p:fade/>
-      </p:transition>
-    </mc:Fallback>
-  </mc:AlternateContent>
-</p:sld>
-</file>
-
-<file path=ppt/slides/slide11.xml><?xml version="1.0" encoding="utf-8"?>
 <p:sld xmlns:a="http://schemas.openxmlformats.org/drawingml/2006/main" xmlns:r="http://schemas.openxmlformats.org/officeDocument/2006/relationships" xmlns:p="http://schemas.openxmlformats.org/presentationml/2006/main">
   <p:cSld>
     <p:bg>
@@ -4162,13 +3953,13 @@
   <p:clrMapOvr>
     <a:masterClrMapping/>
   </p:clrMapOvr>
-  <mc:AlternateContent xmlns:mc="http://schemas.openxmlformats.org/markup-compatibility/2006">
-    <mc:Choice xmlns:p159="http://schemas.microsoft.com/office/powerpoint/2015/09/main" Requires="p159">
+  <mc:AlternateContent xmlns:mc="http://schemas.openxmlformats.org/markup-compatibility/2006" xmlns:p159="http://schemas.microsoft.com/office/powerpoint/2015/09/main">
+    <mc:Choice Requires="p159">
       <p:transition xmlns:p14="http://schemas.microsoft.com/office/powerpoint/2010/main" spd="slow" p14:dur="2000">
         <p159:morph option="byObject"/>
       </p:transition>
     </mc:Choice>
-    <mc:Fallback>
+    <mc:Fallback xmlns="">
       <p:transition spd="slow">
         <p:fade/>
       </p:transition>
@@ -4177,7 +3968,7 @@
 </p:sld>
 </file>
 
-<file path=ppt/slides/slide12.xml><?xml version="1.0" encoding="utf-8"?>
+<file path=ppt/slides/slide11.xml><?xml version="1.0" encoding="utf-8"?>
 <p:sld xmlns:a="http://schemas.openxmlformats.org/drawingml/2006/main" xmlns:r="http://schemas.openxmlformats.org/officeDocument/2006/relationships" xmlns:p="http://schemas.openxmlformats.org/presentationml/2006/main">
   <p:cSld>
     <p:bg>
@@ -4525,6 +4316,841 @@
   <p:clrMapOvr>
     <a:masterClrMapping/>
   </p:clrMapOvr>
+  <mc:AlternateContent xmlns:mc="http://schemas.openxmlformats.org/markup-compatibility/2006" xmlns:p159="http://schemas.microsoft.com/office/powerpoint/2015/09/main">
+    <mc:Choice Requires="p159">
+      <p:transition xmlns:p14="http://schemas.microsoft.com/office/powerpoint/2010/main" spd="slow" p14:dur="2000">
+        <p159:morph option="byObject"/>
+      </p:transition>
+    </mc:Choice>
+    <mc:Fallback xmlns="">
+      <p:transition spd="slow">
+        <p:fade/>
+      </p:transition>
+    </mc:Fallback>
+  </mc:AlternateContent>
+</p:sld>
+</file>
+
+<file path=ppt/slides/slide12.xml><?xml version="1.0" encoding="utf-8"?>
+<p:sld xmlns:a="http://schemas.openxmlformats.org/drawingml/2006/main" xmlns:r="http://schemas.openxmlformats.org/officeDocument/2006/relationships" xmlns:p="http://schemas.openxmlformats.org/presentationml/2006/main">
+  <p:cSld>
+    <p:bg>
+      <p:bgPr>
+        <a:blipFill dpi="0" rotWithShape="1">
+          <a:blip r:embed="rId2">
+            <a:alphaModFix amt="50000"/>
+            <a:lum/>
+          </a:blip>
+          <a:srcRect/>
+          <a:stretch>
+            <a:fillRect t="-4000" b="-4000"/>
+          </a:stretch>
+        </a:blipFill>
+        <a:effectLst/>
+      </p:bgPr>
+    </p:bg>
+    <p:spTree>
+      <p:nvGrpSpPr>
+        <p:cNvPr id="1" name="">
+          <a:extLst>
+            <a:ext uri="{FF2B5EF4-FFF2-40B4-BE49-F238E27FC236}">
+              <a16:creationId xmlns:a16="http://schemas.microsoft.com/office/drawing/2014/main" id="{CE3553D3-1E5A-664A-1466-F8F5D69F5E61}"/>
+            </a:ext>
+          </a:extLst>
+        </p:cNvPr>
+        <p:cNvGrpSpPr/>
+        <p:nvPr/>
+      </p:nvGrpSpPr>
+      <p:grpSpPr>
+        <a:xfrm>
+          <a:off x="0" y="0"/>
+          <a:ext cx="0" cy="0"/>
+          <a:chOff x="0" y="0"/>
+          <a:chExt cx="0" cy="0"/>
+        </a:xfrm>
+      </p:grpSpPr>
+      <p:pic>
+        <p:nvPicPr>
+          <p:cNvPr id="5" name="Picture 4" descr="A blue and orange logo">
+            <a:extLst>
+              <a:ext uri="{FF2B5EF4-FFF2-40B4-BE49-F238E27FC236}">
+                <a16:creationId xmlns:a16="http://schemas.microsoft.com/office/drawing/2014/main" id="{C199BC4D-971E-2DB9-1E4E-F74C41BB371E}"/>
+              </a:ext>
+            </a:extLst>
+          </p:cNvPr>
+          <p:cNvPicPr>
+            <a:picLocks noChangeAspect="1"/>
+          </p:cNvPicPr>
+          <p:nvPr/>
+        </p:nvPicPr>
+        <p:blipFill>
+          <a:blip r:embed="rId3">
+            <a:extLst>
+              <a:ext uri="{28A0092B-C50C-407E-A947-70E740481C1C}">
+                <a14:useLocalDpi xmlns:a14="http://schemas.microsoft.com/office/drawing/2010/main" val="0"/>
+              </a:ext>
+            </a:extLst>
+          </a:blip>
+          <a:srcRect r="40990"/>
+          <a:stretch/>
+        </p:blipFill>
+        <p:spPr>
+          <a:xfrm>
+            <a:off x="10752304" y="12502"/>
+            <a:ext cx="1429966" cy="986828"/>
+          </a:xfrm>
+          <a:prstGeom prst="rect">
+            <a:avLst/>
+          </a:prstGeom>
+        </p:spPr>
+      </p:pic>
+      <p:sp>
+        <p:nvSpPr>
+          <p:cNvPr id="6" name="Rectangle: Rounded Corners 5">
+            <a:extLst>
+              <a:ext uri="{FF2B5EF4-FFF2-40B4-BE49-F238E27FC236}">
+                <a16:creationId xmlns:a16="http://schemas.microsoft.com/office/drawing/2014/main" id="{ED913002-49AD-9B14-9388-5ABDA103C290}"/>
+              </a:ext>
+            </a:extLst>
+          </p:cNvPr>
+          <p:cNvSpPr/>
+          <p:nvPr/>
+        </p:nvSpPr>
+        <p:spPr>
+          <a:xfrm>
+            <a:off x="450714" y="634994"/>
+            <a:ext cx="7402966" cy="986829"/>
+          </a:xfrm>
+          <a:prstGeom prst="roundRect">
+            <a:avLst/>
+          </a:prstGeom>
+          <a:solidFill>
+            <a:schemeClr val="tx1">
+              <a:lumMod val="75000"/>
+              <a:lumOff val="25000"/>
+            </a:schemeClr>
+          </a:solidFill>
+          <a:ln>
+            <a:solidFill>
+              <a:srgbClr val="FFFF00"/>
+            </a:solidFill>
+          </a:ln>
+        </p:spPr>
+        <p:style>
+          <a:lnRef idx="2">
+            <a:schemeClr val="accent1">
+              <a:shade val="15000"/>
+            </a:schemeClr>
+          </a:lnRef>
+          <a:fillRef idx="1">
+            <a:schemeClr val="accent1"/>
+          </a:fillRef>
+          <a:effectRef idx="0">
+            <a:schemeClr val="accent1"/>
+          </a:effectRef>
+          <a:fontRef idx="minor">
+            <a:schemeClr val="lt1"/>
+          </a:fontRef>
+        </p:style>
+        <p:txBody>
+          <a:bodyPr rtlCol="0" anchor="ctr"/>
+          <a:lstStyle/>
+          <a:p>
+            <a:r>
+              <a:rPr lang="pt-BR" sz="3600" dirty="0"/>
+              <a:t>Exercício posicionamento com CSS</a:t>
+            </a:r>
+          </a:p>
+        </p:txBody>
+      </p:sp>
+      <p:sp>
+        <p:nvSpPr>
+          <p:cNvPr id="8" name="Rectangle: Rounded Corners 7">
+            <a:extLst>
+              <a:ext uri="{FF2B5EF4-FFF2-40B4-BE49-F238E27FC236}">
+                <a16:creationId xmlns:a16="http://schemas.microsoft.com/office/drawing/2014/main" id="{F9742BAF-05C1-B356-EE08-416A68150345}"/>
+              </a:ext>
+            </a:extLst>
+          </p:cNvPr>
+          <p:cNvSpPr/>
+          <p:nvPr/>
+        </p:nvSpPr>
+        <p:spPr>
+          <a:xfrm>
+            <a:off x="450714" y="2661920"/>
+            <a:ext cx="4481209" cy="3200399"/>
+          </a:xfrm>
+          <a:prstGeom prst="roundRect">
+            <a:avLst>
+              <a:gd name="adj" fmla="val 6641"/>
+            </a:avLst>
+          </a:prstGeom>
+          <a:solidFill>
+            <a:schemeClr val="tx1">
+              <a:lumMod val="75000"/>
+              <a:lumOff val="25000"/>
+            </a:schemeClr>
+          </a:solidFill>
+          <a:ln>
+            <a:solidFill>
+              <a:srgbClr val="FFFF00"/>
+            </a:solidFill>
+          </a:ln>
+        </p:spPr>
+        <p:style>
+          <a:lnRef idx="2">
+            <a:schemeClr val="accent1">
+              <a:shade val="15000"/>
+            </a:schemeClr>
+          </a:lnRef>
+          <a:fillRef idx="1">
+            <a:schemeClr val="accent1"/>
+          </a:fillRef>
+          <a:effectRef idx="0">
+            <a:schemeClr val="accent1"/>
+          </a:effectRef>
+          <a:fontRef idx="minor">
+            <a:schemeClr val="lt1"/>
+          </a:fontRef>
+        </p:style>
+        <p:txBody>
+          <a:bodyPr rtlCol="0" anchor="t"/>
+          <a:lstStyle/>
+          <a:p>
+            <a:pPr marL="342900" indent="-342900">
+              <a:buFont typeface="Arial" panose="020B0604020202020204" pitchFamily="34" charset="0"/>
+              <a:buChar char="•"/>
+            </a:pPr>
+            <a:r>
+              <a:rPr lang="pt-BR" sz="2000" dirty="0"/>
+              <a:t>Criar um site do seu portifólio, conforme modelo ao lado.</a:t>
+            </a:r>
+          </a:p>
+          <a:p>
+            <a:pPr marL="342900" indent="-342900">
+              <a:buFont typeface="Arial" panose="020B0604020202020204" pitchFamily="34" charset="0"/>
+              <a:buChar char="•"/>
+            </a:pPr>
+            <a:endParaRPr lang="pt-BR" sz="2000" dirty="0"/>
+          </a:p>
+          <a:p>
+            <a:pPr marL="342900" indent="-342900">
+              <a:buFont typeface="Arial" panose="020B0604020202020204" pitchFamily="34" charset="0"/>
+              <a:buChar char="•"/>
+            </a:pPr>
+            <a:r>
+              <a:rPr lang="pt-BR" sz="2000" dirty="0"/>
+              <a:t>Deve conter no mínimo duas páginas HTML e uma </a:t>
+            </a:r>
+            <a:r>
+              <a:rPr lang="pt-BR" sz="2000" dirty="0" err="1"/>
+              <a:t>css</a:t>
+            </a:r>
+            <a:endParaRPr lang="pt-BR" sz="2000" dirty="0"/>
+          </a:p>
+          <a:p>
+            <a:pPr marL="342900" indent="-342900">
+              <a:buFont typeface="Arial" panose="020B0604020202020204" pitchFamily="34" charset="0"/>
+              <a:buChar char="•"/>
+            </a:pPr>
+            <a:endParaRPr lang="pt-BR" sz="2000" dirty="0"/>
+          </a:p>
+          <a:p>
+            <a:pPr marL="342900" indent="-342900">
+              <a:buFont typeface="Arial" panose="020B0604020202020204" pitchFamily="34" charset="0"/>
+              <a:buChar char="•"/>
+            </a:pPr>
+            <a:r>
+              <a:rPr lang="pt-BR" sz="2000" dirty="0"/>
+              <a:t>Separe as secções em &lt;</a:t>
+            </a:r>
+            <a:r>
+              <a:rPr lang="pt-BR" sz="2000" dirty="0" err="1"/>
+              <a:t>div</a:t>
+            </a:r>
+            <a:r>
+              <a:rPr lang="pt-BR" sz="2000" dirty="0"/>
+              <a:t>&gt;, utilize borda e margem para separá-las.</a:t>
+            </a:r>
+          </a:p>
+        </p:txBody>
+      </p:sp>
+      <p:pic>
+        <p:nvPicPr>
+          <p:cNvPr id="7" name="Picture 6">
+            <a:extLst>
+              <a:ext uri="{FF2B5EF4-FFF2-40B4-BE49-F238E27FC236}">
+                <a16:creationId xmlns:a16="http://schemas.microsoft.com/office/drawing/2014/main" id="{EA7245D4-E54A-342B-9FD6-2105D47BD2A0}"/>
+              </a:ext>
+            </a:extLst>
+          </p:cNvPr>
+          <p:cNvPicPr>
+            <a:picLocks noChangeAspect="1"/>
+          </p:cNvPicPr>
+          <p:nvPr/>
+        </p:nvPicPr>
+        <p:blipFill>
+          <a:blip r:embed="rId4"/>
+          <a:stretch>
+            <a:fillRect/>
+          </a:stretch>
+        </p:blipFill>
+        <p:spPr>
+          <a:xfrm>
+            <a:off x="5659120" y="1920604"/>
+            <a:ext cx="5932950" cy="4671260"/>
+          </a:xfrm>
+          <a:prstGeom prst="rect">
+            <a:avLst/>
+          </a:prstGeom>
+        </p:spPr>
+      </p:pic>
+    </p:spTree>
+    <p:extLst>
+      <p:ext uri="{BB962C8B-B14F-4D97-AF65-F5344CB8AC3E}">
+        <p14:creationId xmlns:p14="http://schemas.microsoft.com/office/powerpoint/2010/main" val="786747109"/>
+      </p:ext>
+    </p:extLst>
+  </p:cSld>
+  <p:clrMapOvr>
+    <a:masterClrMapping/>
+  </p:clrMapOvr>
+  <mc:AlternateContent xmlns:mc="http://schemas.openxmlformats.org/markup-compatibility/2006" xmlns:p159="http://schemas.microsoft.com/office/powerpoint/2015/09/main">
+    <mc:Choice Requires="p159">
+      <p:transition xmlns:p14="http://schemas.microsoft.com/office/powerpoint/2010/main" spd="slow" p14:dur="2000">
+        <p159:morph option="byObject"/>
+      </p:transition>
+    </mc:Choice>
+    <mc:Fallback xmlns="">
+      <p:transition spd="slow">
+        <p:fade/>
+      </p:transition>
+    </mc:Fallback>
+  </mc:AlternateContent>
+</p:sld>
+</file>
+
+<file path=ppt/slides/slide13.xml><?xml version="1.0" encoding="utf-8"?>
+<p:sld xmlns:a="http://schemas.openxmlformats.org/drawingml/2006/main" xmlns:r="http://schemas.openxmlformats.org/officeDocument/2006/relationships" xmlns:p="http://schemas.openxmlformats.org/presentationml/2006/main">
+  <p:cSld>
+    <p:bg>
+      <p:bgPr>
+        <a:blipFill dpi="0" rotWithShape="1">
+          <a:blip r:embed="rId2">
+            <a:alphaModFix amt="50000"/>
+            <a:lum/>
+          </a:blip>
+          <a:srcRect/>
+          <a:stretch>
+            <a:fillRect t="-4000" b="-4000"/>
+          </a:stretch>
+        </a:blipFill>
+        <a:effectLst/>
+      </p:bgPr>
+    </p:bg>
+    <p:spTree>
+      <p:nvGrpSpPr>
+        <p:cNvPr id="1" name="">
+          <a:extLst>
+            <a:ext uri="{FF2B5EF4-FFF2-40B4-BE49-F238E27FC236}">
+              <a16:creationId xmlns:a16="http://schemas.microsoft.com/office/drawing/2014/main" id="{5E8E258D-7FAE-97B1-A3CA-78BEDBCD751F}"/>
+            </a:ext>
+          </a:extLst>
+        </p:cNvPr>
+        <p:cNvGrpSpPr/>
+        <p:nvPr/>
+      </p:nvGrpSpPr>
+      <p:grpSpPr>
+        <a:xfrm>
+          <a:off x="0" y="0"/>
+          <a:ext cx="0" cy="0"/>
+          <a:chOff x="0" y="0"/>
+          <a:chExt cx="0" cy="0"/>
+        </a:xfrm>
+      </p:grpSpPr>
+      <p:pic>
+        <p:nvPicPr>
+          <p:cNvPr id="5" name="Picture 4" descr="A blue and orange logo">
+            <a:extLst>
+              <a:ext uri="{FF2B5EF4-FFF2-40B4-BE49-F238E27FC236}">
+                <a16:creationId xmlns:a16="http://schemas.microsoft.com/office/drawing/2014/main" id="{8591107B-81E3-7087-20EF-AF97B60FBFC5}"/>
+              </a:ext>
+            </a:extLst>
+          </p:cNvPr>
+          <p:cNvPicPr>
+            <a:picLocks noChangeAspect="1"/>
+          </p:cNvPicPr>
+          <p:nvPr/>
+        </p:nvPicPr>
+        <p:blipFill>
+          <a:blip r:embed="rId3">
+            <a:extLst>
+              <a:ext uri="{28A0092B-C50C-407E-A947-70E740481C1C}">
+                <a14:useLocalDpi xmlns:a14="http://schemas.microsoft.com/office/drawing/2010/main" val="0"/>
+              </a:ext>
+            </a:extLst>
+          </a:blip>
+          <a:srcRect r="40990"/>
+          <a:stretch/>
+        </p:blipFill>
+        <p:spPr>
+          <a:xfrm>
+            <a:off x="10752304" y="12502"/>
+            <a:ext cx="1429966" cy="986828"/>
+          </a:xfrm>
+          <a:prstGeom prst="rect">
+            <a:avLst/>
+          </a:prstGeom>
+        </p:spPr>
+      </p:pic>
+      <p:sp>
+        <p:nvSpPr>
+          <p:cNvPr id="6" name="Rectangle: Rounded Corners 5">
+            <a:extLst>
+              <a:ext uri="{FF2B5EF4-FFF2-40B4-BE49-F238E27FC236}">
+                <a16:creationId xmlns:a16="http://schemas.microsoft.com/office/drawing/2014/main" id="{CB6644BD-B3F3-77D4-F769-E12433101E28}"/>
+              </a:ext>
+            </a:extLst>
+          </p:cNvPr>
+          <p:cNvSpPr/>
+          <p:nvPr/>
+        </p:nvSpPr>
+        <p:spPr>
+          <a:xfrm>
+            <a:off x="450714" y="634994"/>
+            <a:ext cx="6154367" cy="986829"/>
+          </a:xfrm>
+          <a:prstGeom prst="roundRect">
+            <a:avLst/>
+          </a:prstGeom>
+          <a:solidFill>
+            <a:schemeClr val="tx1">
+              <a:lumMod val="75000"/>
+              <a:lumOff val="25000"/>
+            </a:schemeClr>
+          </a:solidFill>
+          <a:ln>
+            <a:solidFill>
+              <a:srgbClr val="FFFF00"/>
+            </a:solidFill>
+          </a:ln>
+        </p:spPr>
+        <p:style>
+          <a:lnRef idx="2">
+            <a:schemeClr val="accent1">
+              <a:shade val="15000"/>
+            </a:schemeClr>
+          </a:lnRef>
+          <a:fillRef idx="1">
+            <a:schemeClr val="accent1"/>
+          </a:fillRef>
+          <a:effectRef idx="0">
+            <a:schemeClr val="accent1"/>
+          </a:effectRef>
+          <a:fontRef idx="minor">
+            <a:schemeClr val="lt1"/>
+          </a:fontRef>
+        </p:style>
+        <p:txBody>
+          <a:bodyPr rtlCol="0" anchor="ctr"/>
+          <a:lstStyle/>
+          <a:p>
+            <a:r>
+              <a:rPr lang="pt-BR" sz="3600" dirty="0" err="1"/>
+              <a:t>Flexbox</a:t>
+            </a:r>
+            <a:r>
+              <a:rPr lang="pt-BR" sz="3600" dirty="0"/>
+              <a:t> Propriedades</a:t>
+            </a:r>
+          </a:p>
+        </p:txBody>
+      </p:sp>
+      <p:pic>
+        <p:nvPicPr>
+          <p:cNvPr id="3" name="Picture 2">
+            <a:extLst>
+              <a:ext uri="{FF2B5EF4-FFF2-40B4-BE49-F238E27FC236}">
+                <a16:creationId xmlns:a16="http://schemas.microsoft.com/office/drawing/2014/main" id="{328969E0-8411-20B3-2D05-11AE8F8C0C78}"/>
+              </a:ext>
+            </a:extLst>
+          </p:cNvPr>
+          <p:cNvPicPr>
+            <a:picLocks noChangeAspect="1"/>
+          </p:cNvPicPr>
+          <p:nvPr/>
+        </p:nvPicPr>
+        <p:blipFill>
+          <a:blip r:embed="rId4"/>
+          <a:stretch>
+            <a:fillRect/>
+          </a:stretch>
+        </p:blipFill>
+        <p:spPr>
+          <a:xfrm>
+            <a:off x="7518400" y="1741047"/>
+            <a:ext cx="4157956" cy="4971911"/>
+          </a:xfrm>
+          <a:prstGeom prst="rect">
+            <a:avLst/>
+          </a:prstGeom>
+        </p:spPr>
+      </p:pic>
+      <p:sp>
+        <p:nvSpPr>
+          <p:cNvPr id="8" name="Rectangle: Rounded Corners 7">
+            <a:extLst>
+              <a:ext uri="{FF2B5EF4-FFF2-40B4-BE49-F238E27FC236}">
+                <a16:creationId xmlns:a16="http://schemas.microsoft.com/office/drawing/2014/main" id="{A264FFE8-F56D-1DA4-A474-3E1B23A82B47}"/>
+              </a:ext>
+            </a:extLst>
+          </p:cNvPr>
+          <p:cNvSpPr/>
+          <p:nvPr/>
+        </p:nvSpPr>
+        <p:spPr>
+          <a:xfrm>
+            <a:off x="314522" y="1741048"/>
+            <a:ext cx="7067686" cy="4971910"/>
+          </a:xfrm>
+          <a:prstGeom prst="roundRect">
+            <a:avLst>
+              <a:gd name="adj" fmla="val 6641"/>
+            </a:avLst>
+          </a:prstGeom>
+          <a:solidFill>
+            <a:schemeClr val="tx1">
+              <a:lumMod val="75000"/>
+              <a:lumOff val="25000"/>
+            </a:schemeClr>
+          </a:solidFill>
+          <a:ln>
+            <a:solidFill>
+              <a:srgbClr val="FFFF00"/>
+            </a:solidFill>
+          </a:ln>
+        </p:spPr>
+        <p:style>
+          <a:lnRef idx="2">
+            <a:schemeClr val="accent1">
+              <a:shade val="15000"/>
+            </a:schemeClr>
+          </a:lnRef>
+          <a:fillRef idx="1">
+            <a:schemeClr val="accent1"/>
+          </a:fillRef>
+          <a:effectRef idx="0">
+            <a:schemeClr val="accent1"/>
+          </a:effectRef>
+          <a:fontRef idx="minor">
+            <a:schemeClr val="lt1"/>
+          </a:fontRef>
+        </p:style>
+        <p:txBody>
+          <a:bodyPr rtlCol="0" anchor="t"/>
+          <a:lstStyle/>
+          <a:p>
+            <a:pPr marL="342900" indent="-342900">
+              <a:buFont typeface="Arial" panose="020B0604020202020204" pitchFamily="34" charset="0"/>
+              <a:buChar char="•"/>
+            </a:pPr>
+            <a:r>
+              <a:rPr lang="pt-BR" sz="1300" dirty="0"/>
+              <a:t>1. Explicar filhos e pai no </a:t>
+            </a:r>
+            <a:r>
+              <a:rPr lang="pt-BR" sz="1300" dirty="0" err="1"/>
+              <a:t>flex</a:t>
+            </a:r>
+            <a:r>
+              <a:rPr lang="pt-BR" sz="1300" dirty="0"/>
+              <a:t> box</a:t>
+            </a:r>
+          </a:p>
+          <a:p>
+            <a:pPr marL="342900" indent="-342900">
+              <a:buFont typeface="Arial" panose="020B0604020202020204" pitchFamily="34" charset="0"/>
+              <a:buChar char="•"/>
+            </a:pPr>
+            <a:r>
+              <a:rPr lang="pt-BR" sz="1300" dirty="0"/>
+              <a:t>2. No item pai ocupa toda a tela, no filho ocupa somente o espaço necessário do que tem dentro</a:t>
+            </a:r>
+          </a:p>
+          <a:p>
+            <a:pPr marL="342900" indent="-342900">
+              <a:buFont typeface="Arial" panose="020B0604020202020204" pitchFamily="34" charset="0"/>
+              <a:buChar char="•"/>
+            </a:pPr>
+            <a:endParaRPr lang="pt-BR" sz="1300" dirty="0"/>
+          </a:p>
+          <a:p>
+            <a:pPr marL="342900" indent="-342900">
+              <a:buFont typeface="Arial" panose="020B0604020202020204" pitchFamily="34" charset="0"/>
+              <a:buChar char="•"/>
+            </a:pPr>
+            <a:r>
+              <a:rPr lang="pt-BR" sz="1300" dirty="0"/>
+              <a:t>OPÇÕES NO PARENT</a:t>
+            </a:r>
+          </a:p>
+          <a:p>
+            <a:pPr marL="342900" indent="-342900">
+              <a:buFont typeface="Arial" panose="020B0604020202020204" pitchFamily="34" charset="0"/>
+              <a:buChar char="•"/>
+            </a:pPr>
+            <a:endParaRPr lang="pt-BR" sz="1300" dirty="0"/>
+          </a:p>
+          <a:p>
+            <a:pPr marL="342900" indent="-342900">
+              <a:buFont typeface="Arial" panose="020B0604020202020204" pitchFamily="34" charset="0"/>
+              <a:buChar char="•"/>
+            </a:pPr>
+            <a:r>
+              <a:rPr lang="pt-BR" sz="1300" dirty="0"/>
+              <a:t>3. GAP, forma de colocar o espaço entre as </a:t>
+            </a:r>
+            <a:r>
+              <a:rPr lang="pt-BR" sz="1300" dirty="0" err="1"/>
+              <a:t>divs</a:t>
+            </a:r>
+            <a:r>
+              <a:rPr lang="pt-BR" sz="1300" dirty="0"/>
+              <a:t>, tanto na horizontal, quanto na vertical</a:t>
+            </a:r>
+          </a:p>
+          <a:p>
+            <a:pPr marL="342900" indent="-342900">
+              <a:buFont typeface="Arial" panose="020B0604020202020204" pitchFamily="34" charset="0"/>
+              <a:buChar char="•"/>
+            </a:pPr>
+            <a:r>
+              <a:rPr lang="pt-BR" sz="1300" dirty="0"/>
+              <a:t>4. Explicar </a:t>
+            </a:r>
+            <a:r>
+              <a:rPr lang="pt-BR" sz="1300" dirty="0" err="1"/>
+              <a:t>flex</a:t>
+            </a:r>
+            <a:r>
+              <a:rPr lang="pt-BR" sz="1300" dirty="0"/>
+              <a:t> </a:t>
+            </a:r>
+            <a:r>
+              <a:rPr lang="pt-BR" sz="1300" dirty="0" err="1"/>
+              <a:t>directions</a:t>
+            </a:r>
+            <a:r>
+              <a:rPr lang="pt-BR" sz="1300" dirty="0"/>
+              <a:t> (</a:t>
+            </a:r>
+            <a:r>
+              <a:rPr lang="pt-BR" sz="1300" dirty="0" err="1"/>
+              <a:t>rows</a:t>
+            </a:r>
+            <a:r>
+              <a:rPr lang="pt-BR" sz="1300" dirty="0"/>
+              <a:t> e </a:t>
+            </a:r>
+            <a:r>
+              <a:rPr lang="pt-BR" sz="1300" dirty="0" err="1"/>
+              <a:t>columns</a:t>
+            </a:r>
+            <a:r>
+              <a:rPr lang="pt-BR" sz="1300" dirty="0"/>
+              <a:t>)</a:t>
+            </a:r>
+          </a:p>
+          <a:p>
+            <a:pPr marL="342900" indent="-342900">
+              <a:buFont typeface="Arial" panose="020B0604020202020204" pitchFamily="34" charset="0"/>
+              <a:buChar char="•"/>
+            </a:pPr>
+            <a:r>
+              <a:rPr lang="pt-BR" sz="1300" dirty="0"/>
+              <a:t>5. Flex wrap - Trabalhar no tamanho dos itens e no tamanho do container</a:t>
+            </a:r>
+          </a:p>
+          <a:p>
+            <a:pPr marL="342900" indent="-342900">
+              <a:buFont typeface="Arial" panose="020B0604020202020204" pitchFamily="34" charset="0"/>
+              <a:buChar char="•"/>
+            </a:pPr>
+            <a:r>
+              <a:rPr lang="pt-BR" sz="1300" dirty="0"/>
+              <a:t>6. </a:t>
+            </a:r>
+            <a:r>
+              <a:rPr lang="pt-BR" sz="1300" dirty="0" err="1"/>
+              <a:t>Justfy-content</a:t>
+            </a:r>
+            <a:r>
+              <a:rPr lang="pt-BR" sz="1300" dirty="0"/>
+              <a:t> é no </a:t>
+            </a:r>
+            <a:r>
+              <a:rPr lang="pt-BR" sz="1300" dirty="0" err="1"/>
+              <a:t>parent</a:t>
+            </a:r>
+            <a:r>
+              <a:rPr lang="pt-BR" sz="1300" dirty="0"/>
+              <a:t> e alinha horizontalmente </a:t>
+            </a:r>
+            <a:r>
+              <a:rPr lang="pt-BR" sz="1300" dirty="0" err="1"/>
+              <a:t>explcar</a:t>
+            </a:r>
+            <a:r>
+              <a:rPr lang="pt-BR" sz="1300" dirty="0"/>
+              <a:t> os tipos;</a:t>
+            </a:r>
+          </a:p>
+          <a:p>
+            <a:pPr marL="342900" indent="-342900">
+              <a:buFont typeface="Arial" panose="020B0604020202020204" pitchFamily="34" charset="0"/>
+              <a:buChar char="•"/>
+            </a:pPr>
+            <a:r>
+              <a:rPr lang="pt-BR" sz="1300" dirty="0"/>
+              <a:t>7. </a:t>
+            </a:r>
+            <a:r>
+              <a:rPr lang="pt-BR" sz="1300" dirty="0" err="1"/>
+              <a:t>Align</a:t>
+            </a:r>
+            <a:r>
+              <a:rPr lang="pt-BR" sz="1300" dirty="0"/>
+              <a:t>-itens mostrar os tipos</a:t>
+            </a:r>
+          </a:p>
+          <a:p>
+            <a:pPr marL="342900" indent="-342900">
+              <a:buFont typeface="Arial" panose="020B0604020202020204" pitchFamily="34" charset="0"/>
+              <a:buChar char="•"/>
+            </a:pPr>
+            <a:r>
+              <a:rPr lang="pt-BR" sz="1300" dirty="0"/>
+              <a:t>8. Gap diferenciado entre colunas e linhas </a:t>
+            </a:r>
+          </a:p>
+          <a:p>
+            <a:pPr marL="342900" indent="-342900">
+              <a:buFont typeface="Arial" panose="020B0604020202020204" pitchFamily="34" charset="0"/>
+              <a:buChar char="•"/>
+            </a:pPr>
+            <a:endParaRPr lang="pt-BR" sz="1300" dirty="0"/>
+          </a:p>
+          <a:p>
+            <a:pPr marL="342900" indent="-342900">
+              <a:buFont typeface="Arial" panose="020B0604020202020204" pitchFamily="34" charset="0"/>
+              <a:buChar char="•"/>
+            </a:pPr>
+            <a:r>
+              <a:rPr lang="pt-BR" sz="1300" dirty="0"/>
+              <a:t>OPÇÕES NA CHILDREN</a:t>
+            </a:r>
+          </a:p>
+          <a:p>
+            <a:pPr marL="342900" indent="-342900">
+              <a:buFont typeface="Arial" panose="020B0604020202020204" pitchFamily="34" charset="0"/>
+              <a:buChar char="•"/>
+            </a:pPr>
+            <a:endParaRPr lang="pt-BR" sz="1300" dirty="0"/>
+          </a:p>
+          <a:p>
+            <a:pPr marL="342900" indent="-342900">
+              <a:buFont typeface="Arial" panose="020B0604020202020204" pitchFamily="34" charset="0"/>
+              <a:buChar char="•"/>
+            </a:pPr>
+            <a:r>
+              <a:rPr lang="pt-BR" sz="1300" dirty="0"/>
+              <a:t>9. </a:t>
+            </a:r>
+            <a:r>
+              <a:rPr lang="pt-BR" sz="1300" dirty="0" err="1"/>
+              <a:t>flex-grow</a:t>
+            </a:r>
+            <a:r>
+              <a:rPr lang="pt-BR" sz="1300" dirty="0"/>
+              <a:t> é a capacidade do item de aumentar de tamanho, ocupando os espaços vazios</a:t>
+            </a:r>
+          </a:p>
+          <a:p>
+            <a:pPr marL="342900" indent="-342900">
+              <a:buFont typeface="Arial" panose="020B0604020202020204" pitchFamily="34" charset="0"/>
+              <a:buChar char="•"/>
+            </a:pPr>
+            <a:r>
+              <a:rPr lang="pt-BR" sz="1300" dirty="0"/>
+              <a:t>10. </a:t>
+            </a:r>
+            <a:r>
+              <a:rPr lang="pt-BR" sz="1300" dirty="0" err="1"/>
+              <a:t>flex-shrink</a:t>
+            </a:r>
+            <a:r>
+              <a:rPr lang="pt-BR" sz="1300" dirty="0"/>
+              <a:t> é a capacidade que o item tem de diminuir.</a:t>
+            </a:r>
+          </a:p>
+          <a:p>
+            <a:pPr marL="342900" indent="-342900">
+              <a:buFont typeface="Arial" panose="020B0604020202020204" pitchFamily="34" charset="0"/>
+              <a:buChar char="•"/>
+            </a:pPr>
+            <a:r>
+              <a:rPr lang="pt-BR" sz="1300" dirty="0"/>
+              <a:t>11. </a:t>
+            </a:r>
+            <a:r>
+              <a:rPr lang="pt-BR" sz="1300" dirty="0" err="1"/>
+              <a:t>flex-basis</a:t>
+            </a:r>
+            <a:r>
+              <a:rPr lang="pt-BR" sz="1300" dirty="0"/>
+              <a:t>: é o tamanho definido do item, ele assume este tamanho, antes do espaço ser distribuído</a:t>
+            </a:r>
+          </a:p>
+          <a:p>
+            <a:pPr marL="342900" indent="-342900">
+              <a:buFont typeface="Arial" panose="020B0604020202020204" pitchFamily="34" charset="0"/>
+              <a:buChar char="•"/>
+            </a:pPr>
+            <a:r>
+              <a:rPr lang="pt-BR" sz="1300" dirty="0"/>
+              <a:t>12. </a:t>
+            </a:r>
+            <a:r>
+              <a:rPr lang="pt-BR" sz="1300" dirty="0" err="1"/>
+              <a:t>align</a:t>
+            </a:r>
+            <a:r>
+              <a:rPr lang="pt-BR" sz="1300" dirty="0"/>
+              <a:t>-self: é para alinhar somente este item</a:t>
+            </a:r>
+          </a:p>
+          <a:p>
+            <a:pPr marL="342900" indent="-342900">
+              <a:buFont typeface="Arial" panose="020B0604020202020204" pitchFamily="34" charset="0"/>
+              <a:buChar char="•"/>
+            </a:pPr>
+            <a:r>
+              <a:rPr lang="pt-BR" sz="1300" dirty="0"/>
+              <a:t>13. Ordem dos elementos</a:t>
+            </a:r>
+          </a:p>
+        </p:txBody>
+      </p:sp>
+    </p:spTree>
+    <p:extLst>
+      <p:ext uri="{BB962C8B-B14F-4D97-AF65-F5344CB8AC3E}">
+        <p14:creationId xmlns:p14="http://schemas.microsoft.com/office/powerpoint/2010/main" val="347869449"/>
+      </p:ext>
+    </p:extLst>
+  </p:cSld>
+  <p:clrMapOvr>
+    <a:masterClrMapping/>
+  </p:clrMapOvr>
   <mc:AlternateContent xmlns:mc="http://schemas.openxmlformats.org/markup-compatibility/2006">
     <mc:Choice xmlns:p159="http://schemas.microsoft.com/office/powerpoint/2015/09/main" Requires="p159">
       <p:transition xmlns:p14="http://schemas.microsoft.com/office/powerpoint/2010/main" spd="slow" p14:dur="2000">
@@ -4540,7 +5166,7 @@
 </p:sld>
 </file>
 
-<file path=ppt/slides/slide13.xml><?xml version="1.0" encoding="utf-8"?>
+<file path=ppt/slides/slide14.xml><?xml version="1.0" encoding="utf-8"?>
 <p:sld xmlns:a="http://schemas.openxmlformats.org/drawingml/2006/main" xmlns:r="http://schemas.openxmlformats.org/officeDocument/2006/relationships" xmlns:p="http://schemas.openxmlformats.org/presentationml/2006/main">
   <p:cSld>
     <p:bg>
@@ -4756,13 +5382,13 @@
   <p:clrMapOvr>
     <a:masterClrMapping/>
   </p:clrMapOvr>
-  <mc:AlternateContent xmlns:mc="http://schemas.openxmlformats.org/markup-compatibility/2006">
-    <mc:Choice xmlns:p159="http://schemas.microsoft.com/office/powerpoint/2015/09/main" Requires="p159">
+  <mc:AlternateContent xmlns:mc="http://schemas.openxmlformats.org/markup-compatibility/2006" xmlns:p159="http://schemas.microsoft.com/office/powerpoint/2015/09/main">
+    <mc:Choice Requires="p159">
       <p:transition xmlns:p14="http://schemas.microsoft.com/office/powerpoint/2010/main" spd="slow" p14:dur="2000">
         <p159:morph option="byObject"/>
       </p:transition>
     </mc:Choice>
-    <mc:Fallback>
+    <mc:Fallback xmlns="">
       <p:transition spd="slow">
         <p:fade/>
       </p:transition>
@@ -5044,13 +5670,13 @@
   <p:clrMapOvr>
     <a:masterClrMapping/>
   </p:clrMapOvr>
-  <mc:AlternateContent xmlns:mc="http://schemas.openxmlformats.org/markup-compatibility/2006">
-    <mc:Choice xmlns:p159="http://schemas.microsoft.com/office/powerpoint/2015/09/main" Requires="p159">
+  <mc:AlternateContent xmlns:mc="http://schemas.openxmlformats.org/markup-compatibility/2006" xmlns:p159="http://schemas.microsoft.com/office/powerpoint/2015/09/main">
+    <mc:Choice Requires="p159">
       <p:transition xmlns:p14="http://schemas.microsoft.com/office/powerpoint/2010/main" spd="slow" p14:dur="2000">
         <p159:morph option="byObject"/>
       </p:transition>
     </mc:Choice>
-    <mc:Fallback>
+    <mc:Fallback xmlns="">
       <p:transition spd="slow">
         <p:fade/>
       </p:transition>
@@ -5313,13 +5939,13 @@
   <p:clrMapOvr>
     <a:masterClrMapping/>
   </p:clrMapOvr>
-  <mc:AlternateContent xmlns:mc="http://schemas.openxmlformats.org/markup-compatibility/2006">
-    <mc:Choice xmlns:p159="http://schemas.microsoft.com/office/powerpoint/2015/09/main" Requires="p159">
+  <mc:AlternateContent xmlns:mc="http://schemas.openxmlformats.org/markup-compatibility/2006" xmlns:p159="http://schemas.microsoft.com/office/powerpoint/2015/09/main">
+    <mc:Choice Requires="p159">
       <p:transition xmlns:p14="http://schemas.microsoft.com/office/powerpoint/2010/main" spd="slow" p14:dur="2000">
         <p159:morph option="byObject"/>
       </p:transition>
     </mc:Choice>
-    <mc:Fallback>
+    <mc:Fallback xmlns="">
       <p:transition spd="slow">
         <p:fade/>
       </p:transition>
@@ -5646,13 +6272,13 @@
   <p:clrMapOvr>
     <a:masterClrMapping/>
   </p:clrMapOvr>
-  <mc:AlternateContent xmlns:mc="http://schemas.openxmlformats.org/markup-compatibility/2006">
-    <mc:Choice xmlns:p159="http://schemas.microsoft.com/office/powerpoint/2015/09/main" Requires="p159">
+  <mc:AlternateContent xmlns:mc="http://schemas.openxmlformats.org/markup-compatibility/2006" xmlns:p159="http://schemas.microsoft.com/office/powerpoint/2015/09/main">
+    <mc:Choice Requires="p159">
       <p:transition xmlns:p14="http://schemas.microsoft.com/office/powerpoint/2010/main" spd="slow" p14:dur="2000">
         <p159:morph option="byObject"/>
       </p:transition>
     </mc:Choice>
-    <mc:Fallback>
+    <mc:Fallback xmlns="">
       <p:transition spd="slow">
         <p:fade/>
       </p:transition>
@@ -5919,13 +6545,13 @@
   <p:clrMapOvr>
     <a:masterClrMapping/>
   </p:clrMapOvr>
-  <mc:AlternateContent xmlns:mc="http://schemas.openxmlformats.org/markup-compatibility/2006">
-    <mc:Choice xmlns:p159="http://schemas.microsoft.com/office/powerpoint/2015/09/main" Requires="p159">
+  <mc:AlternateContent xmlns:mc="http://schemas.openxmlformats.org/markup-compatibility/2006" xmlns:p159="http://schemas.microsoft.com/office/powerpoint/2015/09/main">
+    <mc:Choice Requires="p159">
       <p:transition xmlns:p14="http://schemas.microsoft.com/office/powerpoint/2010/main" spd="slow" p14:dur="2000">
         <p159:morph option="byObject"/>
       </p:transition>
     </mc:Choice>
-    <mc:Fallback>
+    <mc:Fallback xmlns="">
       <p:transition spd="slow">
         <p:fade/>
       </p:transition>
@@ -6274,13 +6900,13 @@
   <p:clrMapOvr>
     <a:masterClrMapping/>
   </p:clrMapOvr>
-  <mc:AlternateContent xmlns:mc="http://schemas.openxmlformats.org/markup-compatibility/2006">
-    <mc:Choice xmlns:p159="http://schemas.microsoft.com/office/powerpoint/2015/09/main" Requires="p159">
+  <mc:AlternateContent xmlns:mc="http://schemas.openxmlformats.org/markup-compatibility/2006" xmlns:p159="http://schemas.microsoft.com/office/powerpoint/2015/09/main">
+    <mc:Choice Requires="p159">
       <p:transition xmlns:p14="http://schemas.microsoft.com/office/powerpoint/2010/main" spd="slow" p14:dur="2000">
         <p159:morph option="byObject"/>
       </p:transition>
     </mc:Choice>
-    <mc:Fallback>
+    <mc:Fallback xmlns="">
       <p:transition spd="slow">
         <p:fade/>
       </p:transition>
@@ -6290,262 +6916,6 @@
 </file>
 
 <file path=ppt/slides/slide7.xml><?xml version="1.0" encoding="utf-8"?>
-<p:sld xmlns:a="http://schemas.openxmlformats.org/drawingml/2006/main" xmlns:r="http://schemas.openxmlformats.org/officeDocument/2006/relationships" xmlns:p="http://schemas.openxmlformats.org/presentationml/2006/main">
-  <p:cSld>
-    <p:bg>
-      <p:bgPr>
-        <a:blipFill dpi="0" rotWithShape="1">
-          <a:blip r:embed="rId2">
-            <a:alphaModFix amt="50000"/>
-            <a:lum/>
-          </a:blip>
-          <a:srcRect/>
-          <a:stretch>
-            <a:fillRect t="-4000" b="-4000"/>
-          </a:stretch>
-        </a:blipFill>
-        <a:effectLst/>
-      </p:bgPr>
-    </p:bg>
-    <p:spTree>
-      <p:nvGrpSpPr>
-        <p:cNvPr id="1" name="">
-          <a:extLst>
-            <a:ext uri="{FF2B5EF4-FFF2-40B4-BE49-F238E27FC236}">
-              <a16:creationId xmlns:a16="http://schemas.microsoft.com/office/drawing/2014/main" id="{2B4B0D87-DA1E-47D9-312B-0623C7342F87}"/>
-            </a:ext>
-          </a:extLst>
-        </p:cNvPr>
-        <p:cNvGrpSpPr/>
-        <p:nvPr/>
-      </p:nvGrpSpPr>
-      <p:grpSpPr>
-        <a:xfrm>
-          <a:off x="0" y="0"/>
-          <a:ext cx="0" cy="0"/>
-          <a:chOff x="0" y="0"/>
-          <a:chExt cx="0" cy="0"/>
-        </a:xfrm>
-      </p:grpSpPr>
-      <p:sp>
-        <p:nvSpPr>
-          <p:cNvPr id="4" name="Rectangle: Rounded Corners 3">
-            <a:extLst>
-              <a:ext uri="{FF2B5EF4-FFF2-40B4-BE49-F238E27FC236}">
-                <a16:creationId xmlns:a16="http://schemas.microsoft.com/office/drawing/2014/main" id="{25638A30-1377-4E8A-C908-AF5E5FDA38AE}"/>
-              </a:ext>
-            </a:extLst>
-          </p:cNvPr>
-          <p:cNvSpPr/>
-          <p:nvPr/>
-        </p:nvSpPr>
-        <p:spPr>
-          <a:xfrm>
-            <a:off x="450714" y="2110902"/>
-            <a:ext cx="5035686" cy="1177047"/>
-          </a:xfrm>
-          <a:prstGeom prst="roundRect">
-            <a:avLst>
-              <a:gd name="adj" fmla="val 6641"/>
-            </a:avLst>
-          </a:prstGeom>
-          <a:solidFill>
-            <a:schemeClr val="tx1">
-              <a:lumMod val="75000"/>
-              <a:lumOff val="25000"/>
-            </a:schemeClr>
-          </a:solidFill>
-          <a:ln>
-            <a:solidFill>
-              <a:srgbClr val="FFFF00"/>
-            </a:solidFill>
-          </a:ln>
-        </p:spPr>
-        <p:style>
-          <a:lnRef idx="2">
-            <a:schemeClr val="accent1">
-              <a:shade val="15000"/>
-            </a:schemeClr>
-          </a:lnRef>
-          <a:fillRef idx="1">
-            <a:schemeClr val="accent1"/>
-          </a:fillRef>
-          <a:effectRef idx="0">
-            <a:schemeClr val="accent1"/>
-          </a:effectRef>
-          <a:fontRef idx="minor">
-            <a:schemeClr val="lt1"/>
-          </a:fontRef>
-        </p:style>
-        <p:txBody>
-          <a:bodyPr rtlCol="0" anchor="t"/>
-          <a:lstStyle/>
-          <a:p>
-            <a:r>
-              <a:rPr lang="pt-BR" sz="2400" dirty="0"/>
-              <a:t>Colocar o botão do </a:t>
-            </a:r>
-            <a:r>
-              <a:rPr lang="pt-BR" sz="2400" dirty="0" err="1"/>
-              <a:t>whatsApp</a:t>
-            </a:r>
-            <a:r>
-              <a:rPr lang="pt-BR" sz="2400" dirty="0"/>
-              <a:t> na sua página de perfil</a:t>
-            </a:r>
-          </a:p>
-        </p:txBody>
-      </p:sp>
-      <p:pic>
-        <p:nvPicPr>
-          <p:cNvPr id="5" name="Picture 4" descr="A blue and orange logo">
-            <a:extLst>
-              <a:ext uri="{FF2B5EF4-FFF2-40B4-BE49-F238E27FC236}">
-                <a16:creationId xmlns:a16="http://schemas.microsoft.com/office/drawing/2014/main" id="{DA8874D1-1EC6-C526-4BDA-ACDC865A6BE5}"/>
-              </a:ext>
-            </a:extLst>
-          </p:cNvPr>
-          <p:cNvPicPr>
-            <a:picLocks noChangeAspect="1"/>
-          </p:cNvPicPr>
-          <p:nvPr/>
-        </p:nvPicPr>
-        <p:blipFill>
-          <a:blip r:embed="rId3">
-            <a:extLst>
-              <a:ext uri="{28A0092B-C50C-407E-A947-70E740481C1C}">
-                <a14:useLocalDpi xmlns:a14="http://schemas.microsoft.com/office/drawing/2010/main" val="0"/>
-              </a:ext>
-            </a:extLst>
-          </a:blip>
-          <a:srcRect r="40990"/>
-          <a:stretch/>
-        </p:blipFill>
-        <p:spPr>
-          <a:xfrm>
-            <a:off x="10752304" y="12502"/>
-            <a:ext cx="1429966" cy="986828"/>
-          </a:xfrm>
-          <a:prstGeom prst="rect">
-            <a:avLst/>
-          </a:prstGeom>
-        </p:spPr>
-      </p:pic>
-      <p:sp>
-        <p:nvSpPr>
-          <p:cNvPr id="6" name="Rectangle: Rounded Corners 5">
-            <a:extLst>
-              <a:ext uri="{FF2B5EF4-FFF2-40B4-BE49-F238E27FC236}">
-                <a16:creationId xmlns:a16="http://schemas.microsoft.com/office/drawing/2014/main" id="{B8EEA814-2F0E-92D7-CF34-4FF672E614F6}"/>
-              </a:ext>
-            </a:extLst>
-          </p:cNvPr>
-          <p:cNvSpPr/>
-          <p:nvPr/>
-        </p:nvSpPr>
-        <p:spPr>
-          <a:xfrm>
-            <a:off x="450712" y="634994"/>
-            <a:ext cx="7525969" cy="986829"/>
-          </a:xfrm>
-          <a:prstGeom prst="roundRect">
-            <a:avLst/>
-          </a:prstGeom>
-          <a:solidFill>
-            <a:schemeClr val="tx1">
-              <a:lumMod val="75000"/>
-              <a:lumOff val="25000"/>
-            </a:schemeClr>
-          </a:solidFill>
-          <a:ln>
-            <a:solidFill>
-              <a:srgbClr val="FFFF00"/>
-            </a:solidFill>
-          </a:ln>
-        </p:spPr>
-        <p:style>
-          <a:lnRef idx="2">
-            <a:schemeClr val="accent1">
-              <a:shade val="15000"/>
-            </a:schemeClr>
-          </a:lnRef>
-          <a:fillRef idx="1">
-            <a:schemeClr val="accent1"/>
-          </a:fillRef>
-          <a:effectRef idx="0">
-            <a:schemeClr val="accent1"/>
-          </a:effectRef>
-          <a:fontRef idx="minor">
-            <a:schemeClr val="lt1"/>
-          </a:fontRef>
-        </p:style>
-        <p:txBody>
-          <a:bodyPr rtlCol="0" anchor="ctr"/>
-          <a:lstStyle/>
-          <a:p>
-            <a:r>
-              <a:rPr lang="pt-BR" sz="3600" dirty="0"/>
-              <a:t>Exercício: Posicionamento Fixo</a:t>
-            </a:r>
-          </a:p>
-        </p:txBody>
-      </p:sp>
-      <p:pic>
-        <p:nvPicPr>
-          <p:cNvPr id="7" name="Picture 6">
-            <a:extLst>
-              <a:ext uri="{FF2B5EF4-FFF2-40B4-BE49-F238E27FC236}">
-                <a16:creationId xmlns:a16="http://schemas.microsoft.com/office/drawing/2014/main" id="{AC2C861E-F516-DA6B-81C8-31979BC0671C}"/>
-              </a:ext>
-            </a:extLst>
-          </p:cNvPr>
-          <p:cNvPicPr>
-            <a:picLocks noChangeAspect="1"/>
-          </p:cNvPicPr>
-          <p:nvPr/>
-        </p:nvPicPr>
-        <p:blipFill>
-          <a:blip r:embed="rId4"/>
-          <a:stretch>
-            <a:fillRect/>
-          </a:stretch>
-        </p:blipFill>
-        <p:spPr>
-          <a:xfrm>
-            <a:off x="6383556" y="2110902"/>
-            <a:ext cx="4834299" cy="4020207"/>
-          </a:xfrm>
-          <a:prstGeom prst="rect">
-            <a:avLst/>
-          </a:prstGeom>
-        </p:spPr>
-      </p:pic>
-    </p:spTree>
-    <p:extLst>
-      <p:ext uri="{BB962C8B-B14F-4D97-AF65-F5344CB8AC3E}">
-        <p14:creationId xmlns:p14="http://schemas.microsoft.com/office/powerpoint/2010/main" val="1993709416"/>
-      </p:ext>
-    </p:extLst>
-  </p:cSld>
-  <p:clrMapOvr>
-    <a:masterClrMapping/>
-  </p:clrMapOvr>
-  <mc:AlternateContent xmlns:mc="http://schemas.openxmlformats.org/markup-compatibility/2006">
-    <mc:Choice xmlns:p159="http://schemas.microsoft.com/office/powerpoint/2015/09/main" Requires="p159">
-      <p:transition xmlns:p14="http://schemas.microsoft.com/office/powerpoint/2010/main" spd="slow" p14:dur="2000">
-        <p159:morph option="byObject"/>
-      </p:transition>
-    </mc:Choice>
-    <mc:Fallback>
-      <p:transition spd="slow">
-        <p:fade/>
-      </p:transition>
-    </mc:Fallback>
-  </mc:AlternateContent>
-</p:sld>
-</file>
-
-<file path=ppt/slides/slide8.xml><?xml version="1.0" encoding="utf-8"?>
 <p:sld xmlns:a="http://schemas.openxmlformats.org/drawingml/2006/main" xmlns:r="http://schemas.openxmlformats.org/officeDocument/2006/relationships" xmlns:p="http://schemas.openxmlformats.org/presentationml/2006/main">
   <p:cSld>
     <p:bg>
@@ -6803,13 +7173,13 @@
   <p:clrMapOvr>
     <a:masterClrMapping/>
   </p:clrMapOvr>
-  <mc:AlternateContent xmlns:mc="http://schemas.openxmlformats.org/markup-compatibility/2006">
-    <mc:Choice xmlns:p159="http://schemas.microsoft.com/office/powerpoint/2015/09/main" Requires="p159">
+  <mc:AlternateContent xmlns:mc="http://schemas.openxmlformats.org/markup-compatibility/2006" xmlns:p159="http://schemas.microsoft.com/office/powerpoint/2015/09/main">
+    <mc:Choice Requires="p159">
       <p:transition xmlns:p14="http://schemas.microsoft.com/office/powerpoint/2010/main" spd="slow" p14:dur="2000">
         <p159:morph option="byObject"/>
       </p:transition>
     </mc:Choice>
-    <mc:Fallback>
+    <mc:Fallback xmlns="">
       <p:transition spd="slow">
         <p:fade/>
       </p:transition>
@@ -6818,7 +7188,7 @@
 </p:sld>
 </file>
 
-<file path=ppt/slides/slide9.xml><?xml version="1.0" encoding="utf-8"?>
+<file path=ppt/slides/slide8.xml><?xml version="1.0" encoding="utf-8"?>
 <p:sld xmlns:a="http://schemas.openxmlformats.org/drawingml/2006/main" xmlns:r="http://schemas.openxmlformats.org/officeDocument/2006/relationships" xmlns:p="http://schemas.openxmlformats.org/presentationml/2006/main">
   <p:cSld>
     <p:bg>
@@ -7076,13 +7446,359 @@
   <p:clrMapOvr>
     <a:masterClrMapping/>
   </p:clrMapOvr>
-  <mc:AlternateContent xmlns:mc="http://schemas.openxmlformats.org/markup-compatibility/2006">
-    <mc:Choice xmlns:p159="http://schemas.microsoft.com/office/powerpoint/2015/09/main" Requires="p159">
+  <mc:AlternateContent xmlns:mc="http://schemas.openxmlformats.org/markup-compatibility/2006" xmlns:p159="http://schemas.microsoft.com/office/powerpoint/2015/09/main">
+    <mc:Choice Requires="p159">
       <p:transition xmlns:p14="http://schemas.microsoft.com/office/powerpoint/2010/main" spd="slow" p14:dur="2000">
         <p159:morph option="byObject"/>
       </p:transition>
     </mc:Choice>
-    <mc:Fallback>
+    <mc:Fallback xmlns="">
+      <p:transition spd="slow">
+        <p:fade/>
+      </p:transition>
+    </mc:Fallback>
+  </mc:AlternateContent>
+</p:sld>
+</file>
+
+<file path=ppt/slides/slide9.xml><?xml version="1.0" encoding="utf-8"?>
+<p:sld xmlns:a="http://schemas.openxmlformats.org/drawingml/2006/main" xmlns:r="http://schemas.openxmlformats.org/officeDocument/2006/relationships" xmlns:p="http://schemas.openxmlformats.org/presentationml/2006/main">
+  <p:cSld>
+    <p:bg>
+      <p:bgPr>
+        <a:blipFill dpi="0" rotWithShape="1">
+          <a:blip r:embed="rId2">
+            <a:alphaModFix amt="50000"/>
+            <a:lum/>
+          </a:blip>
+          <a:srcRect/>
+          <a:stretch>
+            <a:fillRect t="-4000" b="-4000"/>
+          </a:stretch>
+        </a:blipFill>
+        <a:effectLst/>
+      </p:bgPr>
+    </p:bg>
+    <p:spTree>
+      <p:nvGrpSpPr>
+        <p:cNvPr id="1" name="">
+          <a:extLst>
+            <a:ext uri="{FF2B5EF4-FFF2-40B4-BE49-F238E27FC236}">
+              <a16:creationId xmlns:a16="http://schemas.microsoft.com/office/drawing/2014/main" id="{EB3360B7-A4B9-D265-083B-E9E81E53CB40}"/>
+            </a:ext>
+          </a:extLst>
+        </p:cNvPr>
+        <p:cNvGrpSpPr/>
+        <p:nvPr/>
+      </p:nvGrpSpPr>
+      <p:grpSpPr>
+        <a:xfrm>
+          <a:off x="0" y="0"/>
+          <a:ext cx="0" cy="0"/>
+          <a:chOff x="0" y="0"/>
+          <a:chExt cx="0" cy="0"/>
+        </a:xfrm>
+      </p:grpSpPr>
+      <p:sp>
+        <p:nvSpPr>
+          <p:cNvPr id="4" name="Rectangle: Rounded Corners 3">
+            <a:extLst>
+              <a:ext uri="{FF2B5EF4-FFF2-40B4-BE49-F238E27FC236}">
+                <a16:creationId xmlns:a16="http://schemas.microsoft.com/office/drawing/2014/main" id="{4174F353-F0AD-D7EA-C1EE-E6ACB325632C}"/>
+              </a:ext>
+            </a:extLst>
+          </p:cNvPr>
+          <p:cNvSpPr/>
+          <p:nvPr/>
+        </p:nvSpPr>
+        <p:spPr>
+          <a:xfrm>
+            <a:off x="450714" y="1809345"/>
+            <a:ext cx="4053192" cy="2286000"/>
+          </a:xfrm>
+          <a:prstGeom prst="roundRect">
+            <a:avLst>
+              <a:gd name="adj" fmla="val 6641"/>
+            </a:avLst>
+          </a:prstGeom>
+          <a:solidFill>
+            <a:schemeClr val="tx1">
+              <a:lumMod val="75000"/>
+              <a:lumOff val="25000"/>
+            </a:schemeClr>
+          </a:solidFill>
+          <a:ln>
+            <a:solidFill>
+              <a:srgbClr val="FFFF00"/>
+            </a:solidFill>
+          </a:ln>
+        </p:spPr>
+        <p:style>
+          <a:lnRef idx="2">
+            <a:schemeClr val="accent1">
+              <a:shade val="15000"/>
+            </a:schemeClr>
+          </a:lnRef>
+          <a:fillRef idx="1">
+            <a:schemeClr val="accent1"/>
+          </a:fillRef>
+          <a:effectRef idx="0">
+            <a:schemeClr val="accent1"/>
+          </a:effectRef>
+          <a:fontRef idx="minor">
+            <a:schemeClr val="lt1"/>
+          </a:fontRef>
+        </p:style>
+        <p:txBody>
+          <a:bodyPr rtlCol="0" anchor="t"/>
+          <a:lstStyle/>
+          <a:p>
+            <a:r>
+              <a:rPr lang="pt-BR" dirty="0"/>
+              <a:t>Esses dois métodos são altamente recomendados para construir layouts mais responsivos e dinâmicos. Ambos facilitam o alinhamento e o posicionamento de elementos dentro de um container, mas possuem abordagens ligeiramente diferentes:</a:t>
+            </a:r>
+          </a:p>
+        </p:txBody>
+      </p:sp>
+      <p:pic>
+        <p:nvPicPr>
+          <p:cNvPr id="5" name="Picture 4" descr="A blue and orange logo">
+            <a:extLst>
+              <a:ext uri="{FF2B5EF4-FFF2-40B4-BE49-F238E27FC236}">
+                <a16:creationId xmlns:a16="http://schemas.microsoft.com/office/drawing/2014/main" id="{2B902A59-7B67-F3E3-B1F6-0F81B5155494}"/>
+              </a:ext>
+            </a:extLst>
+          </p:cNvPr>
+          <p:cNvPicPr>
+            <a:picLocks noChangeAspect="1"/>
+          </p:cNvPicPr>
+          <p:nvPr/>
+        </p:nvPicPr>
+        <p:blipFill>
+          <a:blip r:embed="rId3">
+            <a:extLst>
+              <a:ext uri="{28A0092B-C50C-407E-A947-70E740481C1C}">
+                <a14:useLocalDpi xmlns:a14="http://schemas.microsoft.com/office/drawing/2010/main" val="0"/>
+              </a:ext>
+            </a:extLst>
+          </a:blip>
+          <a:srcRect r="40990"/>
+          <a:stretch/>
+        </p:blipFill>
+        <p:spPr>
+          <a:xfrm>
+            <a:off x="10752304" y="12502"/>
+            <a:ext cx="1429966" cy="986828"/>
+          </a:xfrm>
+          <a:prstGeom prst="rect">
+            <a:avLst/>
+          </a:prstGeom>
+        </p:spPr>
+      </p:pic>
+      <p:sp>
+        <p:nvSpPr>
+          <p:cNvPr id="6" name="Rectangle: Rounded Corners 5">
+            <a:extLst>
+              <a:ext uri="{FF2B5EF4-FFF2-40B4-BE49-F238E27FC236}">
+                <a16:creationId xmlns:a16="http://schemas.microsoft.com/office/drawing/2014/main" id="{F5EDE1D2-879C-F22C-9BDE-EFD5454EAE44}"/>
+              </a:ext>
+            </a:extLst>
+          </p:cNvPr>
+          <p:cNvSpPr/>
+          <p:nvPr/>
+        </p:nvSpPr>
+        <p:spPr>
+          <a:xfrm>
+            <a:off x="450714" y="634994"/>
+            <a:ext cx="7360598" cy="986829"/>
+          </a:xfrm>
+          <a:prstGeom prst="roundRect">
+            <a:avLst/>
+          </a:prstGeom>
+          <a:solidFill>
+            <a:schemeClr val="tx1">
+              <a:lumMod val="75000"/>
+              <a:lumOff val="25000"/>
+            </a:schemeClr>
+          </a:solidFill>
+          <a:ln>
+            <a:solidFill>
+              <a:srgbClr val="FFFF00"/>
+            </a:solidFill>
+          </a:ln>
+        </p:spPr>
+        <p:style>
+          <a:lnRef idx="2">
+            <a:schemeClr val="accent1">
+              <a:shade val="15000"/>
+            </a:schemeClr>
+          </a:lnRef>
+          <a:fillRef idx="1">
+            <a:schemeClr val="accent1"/>
+          </a:fillRef>
+          <a:effectRef idx="0">
+            <a:schemeClr val="accent1"/>
+          </a:effectRef>
+          <a:fontRef idx="minor">
+            <a:schemeClr val="lt1"/>
+          </a:fontRef>
+        </p:style>
+        <p:txBody>
+          <a:bodyPr rtlCol="0" anchor="ctr"/>
+          <a:lstStyle/>
+          <a:p>
+            <a:r>
+              <a:rPr lang="pt-BR" sz="3600" dirty="0"/>
+              <a:t>Posicionamento com </a:t>
+            </a:r>
+            <a:r>
+              <a:rPr lang="pt-BR" sz="3600" dirty="0" err="1"/>
+              <a:t>Flexbox</a:t>
+            </a:r>
+            <a:r>
+              <a:rPr lang="pt-BR" sz="3600" dirty="0"/>
+              <a:t> e Grid</a:t>
+            </a:r>
+          </a:p>
+        </p:txBody>
+      </p:sp>
+      <p:sp>
+        <p:nvSpPr>
+          <p:cNvPr id="2" name="Rectangle: Rounded Corners 1">
+            <a:extLst>
+              <a:ext uri="{FF2B5EF4-FFF2-40B4-BE49-F238E27FC236}">
+                <a16:creationId xmlns:a16="http://schemas.microsoft.com/office/drawing/2014/main" id="{F6D2E17A-F19C-32BE-95A7-C3330B960981}"/>
+              </a:ext>
+            </a:extLst>
+          </p:cNvPr>
+          <p:cNvSpPr/>
+          <p:nvPr/>
+        </p:nvSpPr>
+        <p:spPr>
+          <a:xfrm>
+            <a:off x="450714" y="4282867"/>
+            <a:ext cx="4481209" cy="2003898"/>
+          </a:xfrm>
+          <a:prstGeom prst="roundRect">
+            <a:avLst>
+              <a:gd name="adj" fmla="val 6641"/>
+            </a:avLst>
+          </a:prstGeom>
+          <a:solidFill>
+            <a:schemeClr val="tx1">
+              <a:lumMod val="75000"/>
+              <a:lumOff val="25000"/>
+            </a:schemeClr>
+          </a:solidFill>
+          <a:ln>
+            <a:solidFill>
+              <a:srgbClr val="FFFF00"/>
+            </a:solidFill>
+          </a:ln>
+        </p:spPr>
+        <p:style>
+          <a:lnRef idx="2">
+            <a:schemeClr val="accent1">
+              <a:shade val="15000"/>
+            </a:schemeClr>
+          </a:lnRef>
+          <a:fillRef idx="1">
+            <a:schemeClr val="accent1"/>
+          </a:fillRef>
+          <a:effectRef idx="0">
+            <a:schemeClr val="accent1"/>
+          </a:effectRef>
+          <a:fontRef idx="minor">
+            <a:schemeClr val="lt1"/>
+          </a:fontRef>
+        </p:style>
+        <p:txBody>
+          <a:bodyPr rtlCol="0" anchor="t"/>
+          <a:lstStyle/>
+          <a:p>
+            <a:pPr marL="342900" indent="-342900">
+              <a:buFont typeface="Arial" panose="020B0604020202020204" pitchFamily="34" charset="0"/>
+              <a:buChar char="•"/>
+            </a:pPr>
+            <a:r>
+              <a:rPr lang="pt-BR" sz="1500" b="1" dirty="0" err="1"/>
+              <a:t>Flexbox</a:t>
+            </a:r>
+            <a:r>
+              <a:rPr lang="pt-BR" sz="1500" dirty="0"/>
+              <a:t> é ideal para layouts unidimensionais (uma linha ou uma coluna).</a:t>
+            </a:r>
+          </a:p>
+          <a:p>
+            <a:pPr marL="342900" indent="-342900">
+              <a:buFont typeface="Arial" panose="020B0604020202020204" pitchFamily="34" charset="0"/>
+              <a:buChar char="•"/>
+            </a:pPr>
+            <a:endParaRPr lang="pt-BR" sz="1500" dirty="0"/>
+          </a:p>
+          <a:p>
+            <a:pPr marL="342900" indent="-342900">
+              <a:buFont typeface="Arial" panose="020B0604020202020204" pitchFamily="34" charset="0"/>
+              <a:buChar char="•"/>
+            </a:pPr>
+            <a:r>
+              <a:rPr lang="pt-BR" sz="1500" b="1" dirty="0"/>
+              <a:t>Grid</a:t>
+            </a:r>
+            <a:r>
+              <a:rPr lang="pt-BR" sz="1500" dirty="0"/>
+              <a:t> é mais potente para layouts bidimensionais, permitindo organizar elementos em linhas e colunas simultaneamente.</a:t>
+            </a:r>
+          </a:p>
+        </p:txBody>
+      </p:sp>
+      <p:pic>
+        <p:nvPicPr>
+          <p:cNvPr id="8" name="Picture 7">
+            <a:extLst>
+              <a:ext uri="{FF2B5EF4-FFF2-40B4-BE49-F238E27FC236}">
+                <a16:creationId xmlns:a16="http://schemas.microsoft.com/office/drawing/2014/main" id="{B4E40B3E-91AB-58BC-2577-46F90C9A78DC}"/>
+              </a:ext>
+            </a:extLst>
+          </p:cNvPr>
+          <p:cNvPicPr>
+            <a:picLocks noChangeAspect="1"/>
+          </p:cNvPicPr>
+          <p:nvPr/>
+        </p:nvPicPr>
+        <p:blipFill>
+          <a:blip r:embed="rId4"/>
+          <a:stretch>
+            <a:fillRect/>
+          </a:stretch>
+        </p:blipFill>
+        <p:spPr>
+          <a:xfrm>
+            <a:off x="5082078" y="1721796"/>
+            <a:ext cx="6852098" cy="3650708"/>
+          </a:xfrm>
+          <a:prstGeom prst="rect">
+            <a:avLst/>
+          </a:prstGeom>
+        </p:spPr>
+      </p:pic>
+    </p:spTree>
+    <p:extLst>
+      <p:ext uri="{BB962C8B-B14F-4D97-AF65-F5344CB8AC3E}">
+        <p14:creationId xmlns:p14="http://schemas.microsoft.com/office/powerpoint/2010/main" val="1500817691"/>
+      </p:ext>
+    </p:extLst>
+  </p:cSld>
+  <p:clrMapOvr>
+    <a:masterClrMapping/>
+  </p:clrMapOvr>
+  <mc:AlternateContent xmlns:mc="http://schemas.openxmlformats.org/markup-compatibility/2006" xmlns:p159="http://schemas.microsoft.com/office/powerpoint/2015/09/main">
+    <mc:Choice Requires="p159">
+      <p:transition xmlns:p14="http://schemas.microsoft.com/office/powerpoint/2010/main" spd="slow" p14:dur="2000">
+        <p159:morph option="byObject"/>
+      </p:transition>
+    </mc:Choice>
+    <mc:Fallback xmlns="">
       <p:transition spd="slow">
         <p:fade/>
       </p:transition>

</xml_diff>